<commit_message>
Complément partie délégué (partiel) + complément partie gestion évènement (partiel)
</commit_message>
<xml_diff>
--- a/CoursCS2.pptx
+++ b/CoursCS2.pptx
@@ -168,7 +168,7 @@
           <a:noFill/>
           <a:extLst>
             <a:ext uri="{909E8E84-426E-40dd-AFC4-6F175D3DCCD1}">
-              <a14:hiddenFill xmlns:a14="http://schemas.microsoft.com/office/drawing/2010/main" xmlns="">
+              <a14:hiddenFill xmlns="" xmlns:a14="http://schemas.microsoft.com/office/drawing/2010/main">
                 <a:solidFill>
                   <a:srgbClr val="FFFFFF"/>
                 </a:solidFill>
@@ -228,7 +228,7 @@
             </a:ln>
             <a:extLst>
               <a:ext uri="{91240B29-F687-4f45-9708-019B960494DF}">
-                <a14:hiddenLine xmlns:a14="http://schemas.microsoft.com/office/drawing/2010/main" xmlns="" w="9525">
+                <a14:hiddenLine xmlns="" xmlns:a14="http://schemas.microsoft.com/office/drawing/2010/main" w="9525">
                   <a:solidFill>
                     <a:srgbClr val="000000"/>
                   </a:solidFill>
@@ -318,7 +318,7 @@
             </a:ln>
             <a:extLst>
               <a:ext uri="{91240B29-F687-4f45-9708-019B960494DF}">
-                <a14:hiddenLine xmlns:a14="http://schemas.microsoft.com/office/drawing/2010/main" xmlns="" w="9525">
+                <a14:hiddenLine xmlns="" xmlns:a14="http://schemas.microsoft.com/office/drawing/2010/main" w="9525">
                   <a:solidFill>
                     <a:srgbClr val="000000"/>
                   </a:solidFill>
@@ -408,7 +408,7 @@
             </a:ln>
             <a:extLst>
               <a:ext uri="{91240B29-F687-4f45-9708-019B960494DF}">
-                <a14:hiddenLine xmlns:a14="http://schemas.microsoft.com/office/drawing/2010/main" xmlns="" w="9525">
+                <a14:hiddenLine xmlns="" xmlns:a14="http://schemas.microsoft.com/office/drawing/2010/main" w="9525">
                   <a:solidFill>
                     <a:srgbClr val="000000"/>
                   </a:solidFill>
@@ -442,7 +442,7 @@
             </a:ln>
             <a:extLst>
               <a:ext uri="{91240B29-F687-4f45-9708-019B960494DF}">
-                <a14:hiddenLine xmlns:a14="http://schemas.microsoft.com/office/drawing/2010/main" xmlns="" w="9525">
+                <a14:hiddenLine xmlns="" xmlns:a14="http://schemas.microsoft.com/office/drawing/2010/main" w="9525">
                   <a:solidFill>
                     <a:srgbClr val="000000"/>
                   </a:solidFill>
@@ -532,7 +532,7 @@
             </a:ln>
             <a:extLst>
               <a:ext uri="{91240B29-F687-4f45-9708-019B960494DF}">
-                <a14:hiddenLine xmlns:a14="http://schemas.microsoft.com/office/drawing/2010/main" xmlns="" w="9525">
+                <a14:hiddenLine xmlns="" xmlns:a14="http://schemas.microsoft.com/office/drawing/2010/main" w="9525">
                   <a:solidFill>
                     <a:srgbClr val="000000"/>
                   </a:solidFill>
@@ -594,7 +594,7 @@
             </a:ln>
             <a:extLst>
               <a:ext uri="{91240B29-F687-4f45-9708-019B960494DF}">
-                <a14:hiddenLine xmlns:a14="http://schemas.microsoft.com/office/drawing/2010/main" xmlns="" w="9525">
+                <a14:hiddenLine xmlns="" xmlns:a14="http://schemas.microsoft.com/office/drawing/2010/main" w="9525">
                   <a:solidFill>
                     <a:srgbClr val="000000"/>
                   </a:solidFill>
@@ -656,7 +656,7 @@
             </a:ln>
             <a:extLst>
               <a:ext uri="{91240B29-F687-4f45-9708-019B960494DF}">
-                <a14:hiddenLine xmlns:a14="http://schemas.microsoft.com/office/drawing/2010/main" xmlns="" w="9525">
+                <a14:hiddenLine xmlns="" xmlns:a14="http://schemas.microsoft.com/office/drawing/2010/main" w="9525">
                   <a:solidFill>
                     <a:srgbClr val="000000"/>
                   </a:solidFill>
@@ -746,7 +746,7 @@
             </a:ln>
             <a:extLst>
               <a:ext uri="{91240B29-F687-4f45-9708-019B960494DF}">
-                <a14:hiddenLine xmlns:a14="http://schemas.microsoft.com/office/drawing/2010/main" xmlns="" w="9525">
+                <a14:hiddenLine xmlns="" xmlns:a14="http://schemas.microsoft.com/office/drawing/2010/main" w="9525">
                   <a:solidFill>
                     <a:srgbClr val="000000"/>
                   </a:solidFill>
@@ -808,7 +808,7 @@
             </a:ln>
             <a:extLst>
               <a:ext uri="{91240B29-F687-4f45-9708-019B960494DF}">
-                <a14:hiddenLine xmlns:a14="http://schemas.microsoft.com/office/drawing/2010/main" xmlns="" w="9525">
+                <a14:hiddenLine xmlns="" xmlns:a14="http://schemas.microsoft.com/office/drawing/2010/main" w="9525">
                   <a:solidFill>
                     <a:srgbClr val="000000"/>
                   </a:solidFill>
@@ -870,7 +870,7 @@
             </a:ln>
             <a:extLst>
               <a:ext uri="{91240B29-F687-4f45-9708-019B960494DF}">
-                <a14:hiddenLine xmlns:a14="http://schemas.microsoft.com/office/drawing/2010/main" xmlns="" w="9525">
+                <a14:hiddenLine xmlns="" xmlns:a14="http://schemas.microsoft.com/office/drawing/2010/main" w="9525">
                   <a:solidFill>
                     <a:srgbClr val="000000"/>
                   </a:solidFill>
@@ -960,7 +960,7 @@
             </a:ln>
             <a:extLst>
               <a:ext uri="{91240B29-F687-4f45-9708-019B960494DF}">
-                <a14:hiddenLine xmlns:a14="http://schemas.microsoft.com/office/drawing/2010/main" xmlns="" w="9525">
+                <a14:hiddenLine xmlns="" xmlns:a14="http://schemas.microsoft.com/office/drawing/2010/main" w="9525">
                   <a:solidFill>
                     <a:srgbClr val="000000"/>
                   </a:solidFill>
@@ -1050,7 +1050,7 @@
             </a:ln>
             <a:extLst>
               <a:ext uri="{91240B29-F687-4f45-9708-019B960494DF}">
-                <a14:hiddenLine xmlns:a14="http://schemas.microsoft.com/office/drawing/2010/main" xmlns="" w="9525">
+                <a14:hiddenLine xmlns="" xmlns:a14="http://schemas.microsoft.com/office/drawing/2010/main" w="9525">
                   <a:solidFill>
                     <a:srgbClr val="000000"/>
                   </a:solidFill>
@@ -1112,7 +1112,7 @@
             </a:ln>
             <a:extLst>
               <a:ext uri="{91240B29-F687-4f45-9708-019B960494DF}">
-                <a14:hiddenLine xmlns:a14="http://schemas.microsoft.com/office/drawing/2010/main" xmlns="" w="9525">
+                <a14:hiddenLine xmlns="" xmlns:a14="http://schemas.microsoft.com/office/drawing/2010/main" w="9525">
                   <a:solidFill>
                     <a:srgbClr val="000000"/>
                   </a:solidFill>
@@ -1222,7 +1222,7 @@
             </a:ln>
             <a:extLst>
               <a:ext uri="{91240B29-F687-4f45-9708-019B960494DF}">
-                <a14:hiddenLine xmlns:a14="http://schemas.microsoft.com/office/drawing/2010/main" xmlns="" w="9525">
+                <a14:hiddenLine xmlns="" xmlns:a14="http://schemas.microsoft.com/office/drawing/2010/main" w="9525">
                   <a:solidFill>
                     <a:srgbClr val="000000"/>
                   </a:solidFill>
@@ -1284,7 +1284,7 @@
             </a:ln>
             <a:extLst>
               <a:ext uri="{91240B29-F687-4f45-9708-019B960494DF}">
-                <a14:hiddenLine xmlns:a14="http://schemas.microsoft.com/office/drawing/2010/main" xmlns="" w="9525">
+                <a14:hiddenLine xmlns="" xmlns:a14="http://schemas.microsoft.com/office/drawing/2010/main" w="9525">
                   <a:solidFill>
                     <a:srgbClr val="000000"/>
                   </a:solidFill>
@@ -1374,7 +1374,7 @@
             </a:ln>
             <a:extLst>
               <a:ext uri="{91240B29-F687-4f45-9708-019B960494DF}">
-                <a14:hiddenLine xmlns:a14="http://schemas.microsoft.com/office/drawing/2010/main" xmlns="" w="9525">
+                <a14:hiddenLine xmlns="" xmlns:a14="http://schemas.microsoft.com/office/drawing/2010/main" w="9525">
                   <a:solidFill>
                     <a:srgbClr val="000000"/>
                   </a:solidFill>
@@ -1464,7 +1464,7 @@
             </a:ln>
             <a:extLst>
               <a:ext uri="{91240B29-F687-4f45-9708-019B960494DF}">
-                <a14:hiddenLine xmlns:a14="http://schemas.microsoft.com/office/drawing/2010/main" xmlns="" w="9525">
+                <a14:hiddenLine xmlns="" xmlns:a14="http://schemas.microsoft.com/office/drawing/2010/main" w="9525">
                   <a:solidFill>
                     <a:srgbClr val="000000"/>
                   </a:solidFill>
@@ -1526,7 +1526,7 @@
             </a:ln>
             <a:extLst>
               <a:ext uri="{91240B29-F687-4f45-9708-019B960494DF}">
-                <a14:hiddenLine xmlns:a14="http://schemas.microsoft.com/office/drawing/2010/main" xmlns="" w="9525">
+                <a14:hiddenLine xmlns="" xmlns:a14="http://schemas.microsoft.com/office/drawing/2010/main" w="9525">
                   <a:solidFill>
                     <a:srgbClr val="000000"/>
                   </a:solidFill>
@@ -1616,7 +1616,7 @@
             </a:ln>
             <a:extLst>
               <a:ext uri="{91240B29-F687-4f45-9708-019B960494DF}">
-                <a14:hiddenLine xmlns:a14="http://schemas.microsoft.com/office/drawing/2010/main" xmlns="" w="9525">
+                <a14:hiddenLine xmlns="" xmlns:a14="http://schemas.microsoft.com/office/drawing/2010/main" w="9525">
                   <a:solidFill>
                     <a:srgbClr val="000000"/>
                   </a:solidFill>
@@ -1706,7 +1706,7 @@
             </a:ln>
             <a:extLst>
               <a:ext uri="{91240B29-F687-4f45-9708-019B960494DF}">
-                <a14:hiddenLine xmlns:a14="http://schemas.microsoft.com/office/drawing/2010/main" xmlns="" w="9525">
+                <a14:hiddenLine xmlns="" xmlns:a14="http://schemas.microsoft.com/office/drawing/2010/main" w="9525">
                   <a:solidFill>
                     <a:srgbClr val="000000"/>
                   </a:solidFill>
@@ -1762,7 +1762,7 @@
             </a:ln>
             <a:extLst>
               <a:ext uri="{91240B29-F687-4f45-9708-019B960494DF}">
-                <a14:hiddenLine xmlns:a14="http://schemas.microsoft.com/office/drawing/2010/main" xmlns="" w="9525">
+                <a14:hiddenLine xmlns="" xmlns:a14="http://schemas.microsoft.com/office/drawing/2010/main" w="9525">
                   <a:solidFill>
                     <a:srgbClr val="000000"/>
                   </a:solidFill>
@@ -1852,7 +1852,7 @@
             </a:ln>
             <a:extLst>
               <a:ext uri="{91240B29-F687-4f45-9708-019B960494DF}">
-                <a14:hiddenLine xmlns:a14="http://schemas.microsoft.com/office/drawing/2010/main" xmlns="" w="9525">
+                <a14:hiddenLine xmlns="" xmlns:a14="http://schemas.microsoft.com/office/drawing/2010/main" w="9525">
                   <a:solidFill>
                     <a:srgbClr val="000000"/>
                   </a:solidFill>
@@ -1908,7 +1908,7 @@
             </a:ln>
             <a:extLst>
               <a:ext uri="{91240B29-F687-4f45-9708-019B960494DF}">
-                <a14:hiddenLine xmlns:a14="http://schemas.microsoft.com/office/drawing/2010/main" xmlns="" w="9525">
+                <a14:hiddenLine xmlns="" xmlns:a14="http://schemas.microsoft.com/office/drawing/2010/main" w="9525">
                   <a:solidFill>
                     <a:srgbClr val="000000"/>
                   </a:solidFill>
@@ -1998,7 +1998,7 @@
             </a:ln>
             <a:extLst>
               <a:ext uri="{91240B29-F687-4f45-9708-019B960494DF}">
-                <a14:hiddenLine xmlns:a14="http://schemas.microsoft.com/office/drawing/2010/main" xmlns="" w="9525">
+                <a14:hiddenLine xmlns="" xmlns:a14="http://schemas.microsoft.com/office/drawing/2010/main" w="9525">
                   <a:solidFill>
                     <a:srgbClr val="000000"/>
                   </a:solidFill>
@@ -2066,7 +2066,7 @@
             </a:ln>
             <a:extLst>
               <a:ext uri="{91240B29-F687-4f45-9708-019B960494DF}">
-                <a14:hiddenLine xmlns:a14="http://schemas.microsoft.com/office/drawing/2010/main" xmlns="" w="9525">
+                <a14:hiddenLine xmlns="" xmlns:a14="http://schemas.microsoft.com/office/drawing/2010/main" w="9525">
                   <a:solidFill>
                     <a:srgbClr val="000000"/>
                   </a:solidFill>
@@ -2156,7 +2156,7 @@
             </a:ln>
             <a:extLst>
               <a:ext uri="{91240B29-F687-4f45-9708-019B960494DF}">
-                <a14:hiddenLine xmlns:a14="http://schemas.microsoft.com/office/drawing/2010/main" xmlns="" w="9525">
+                <a14:hiddenLine xmlns="" xmlns:a14="http://schemas.microsoft.com/office/drawing/2010/main" w="9525">
                   <a:solidFill>
                     <a:srgbClr val="000000"/>
                   </a:solidFill>
@@ -2224,7 +2224,7 @@
             </a:ln>
             <a:extLst>
               <a:ext uri="{91240B29-F687-4f45-9708-019B960494DF}">
-                <a14:hiddenLine xmlns:a14="http://schemas.microsoft.com/office/drawing/2010/main" xmlns="" w="9525">
+                <a14:hiddenLine xmlns="" xmlns:a14="http://schemas.microsoft.com/office/drawing/2010/main" w="9525">
                   <a:solidFill>
                     <a:srgbClr val="000000"/>
                   </a:solidFill>
@@ -2314,7 +2314,7 @@
             </a:ln>
             <a:extLst>
               <a:ext uri="{91240B29-F687-4f45-9708-019B960494DF}">
-                <a14:hiddenLine xmlns:a14="http://schemas.microsoft.com/office/drawing/2010/main" xmlns="" w="9525">
+                <a14:hiddenLine xmlns="" xmlns:a14="http://schemas.microsoft.com/office/drawing/2010/main" w="9525">
                   <a:solidFill>
                     <a:srgbClr val="000000"/>
                   </a:solidFill>
@@ -2348,7 +2348,7 @@
             </a:ln>
             <a:extLst>
               <a:ext uri="{91240B29-F687-4f45-9708-019B960494DF}">
-                <a14:hiddenLine xmlns:a14="http://schemas.microsoft.com/office/drawing/2010/main" xmlns="" w="9525">
+                <a14:hiddenLine xmlns="" xmlns:a14="http://schemas.microsoft.com/office/drawing/2010/main" w="9525">
                   <a:solidFill>
                     <a:srgbClr val="000000"/>
                   </a:solidFill>
@@ -2438,7 +2438,7 @@
             </a:ln>
             <a:extLst>
               <a:ext uri="{91240B29-F687-4f45-9708-019B960494DF}">
-                <a14:hiddenLine xmlns:a14="http://schemas.microsoft.com/office/drawing/2010/main" xmlns="" w="9525">
+                <a14:hiddenLine xmlns="" xmlns:a14="http://schemas.microsoft.com/office/drawing/2010/main" w="9525">
                   <a:solidFill>
                     <a:srgbClr val="000000"/>
                   </a:solidFill>
@@ -2500,7 +2500,7 @@
             </a:ln>
             <a:extLst>
               <a:ext uri="{91240B29-F687-4f45-9708-019B960494DF}">
-                <a14:hiddenLine xmlns:a14="http://schemas.microsoft.com/office/drawing/2010/main" xmlns="" w="9525">
+                <a14:hiddenLine xmlns="" xmlns:a14="http://schemas.microsoft.com/office/drawing/2010/main" w="9525">
                   <a:solidFill>
                     <a:srgbClr val="000000"/>
                   </a:solidFill>
@@ -2562,7 +2562,7 @@
             </a:ln>
             <a:extLst>
               <a:ext uri="{91240B29-F687-4f45-9708-019B960494DF}">
-                <a14:hiddenLine xmlns:a14="http://schemas.microsoft.com/office/drawing/2010/main" xmlns="" w="9525">
+                <a14:hiddenLine xmlns="" xmlns:a14="http://schemas.microsoft.com/office/drawing/2010/main" w="9525">
                   <a:solidFill>
                     <a:srgbClr val="000000"/>
                   </a:solidFill>
@@ -2652,7 +2652,7 @@
             </a:ln>
             <a:extLst>
               <a:ext uri="{91240B29-F687-4f45-9708-019B960494DF}">
-                <a14:hiddenLine xmlns:a14="http://schemas.microsoft.com/office/drawing/2010/main" xmlns="" w="9525">
+                <a14:hiddenLine xmlns="" xmlns:a14="http://schemas.microsoft.com/office/drawing/2010/main" w="9525">
                   <a:solidFill>
                     <a:srgbClr val="000000"/>
                   </a:solidFill>
@@ -2720,7 +2720,7 @@
             </a:ln>
             <a:extLst>
               <a:ext uri="{91240B29-F687-4f45-9708-019B960494DF}">
-                <a14:hiddenLine xmlns:a14="http://schemas.microsoft.com/office/drawing/2010/main" xmlns="" w="9525">
+                <a14:hiddenLine xmlns="" xmlns:a14="http://schemas.microsoft.com/office/drawing/2010/main" w="9525">
                   <a:solidFill>
                     <a:srgbClr val="000000"/>
                   </a:solidFill>
@@ -2782,7 +2782,7 @@
             </a:ln>
             <a:extLst>
               <a:ext uri="{91240B29-F687-4f45-9708-019B960494DF}">
-                <a14:hiddenLine xmlns:a14="http://schemas.microsoft.com/office/drawing/2010/main" xmlns="" w="9525">
+                <a14:hiddenLine xmlns="" xmlns:a14="http://schemas.microsoft.com/office/drawing/2010/main" w="9525">
                   <a:solidFill>
                     <a:srgbClr val="000000"/>
                   </a:solidFill>
@@ -2872,7 +2872,7 @@
             </a:ln>
             <a:extLst>
               <a:ext uri="{91240B29-F687-4f45-9708-019B960494DF}">
-                <a14:hiddenLine xmlns:a14="http://schemas.microsoft.com/office/drawing/2010/main" xmlns="" w="9525">
+                <a14:hiddenLine xmlns="" xmlns:a14="http://schemas.microsoft.com/office/drawing/2010/main" w="9525">
                   <a:solidFill>
                     <a:srgbClr val="000000"/>
                   </a:solidFill>
@@ -2934,7 +2934,7 @@
             </a:ln>
             <a:extLst>
               <a:ext uri="{91240B29-F687-4f45-9708-019B960494DF}">
-                <a14:hiddenLine xmlns:a14="http://schemas.microsoft.com/office/drawing/2010/main" xmlns="" w="9525">
+                <a14:hiddenLine xmlns="" xmlns:a14="http://schemas.microsoft.com/office/drawing/2010/main" w="9525">
                   <a:solidFill>
                     <a:srgbClr val="000000"/>
                   </a:solidFill>
@@ -3024,7 +3024,7 @@
             </a:ln>
             <a:extLst>
               <a:ext uri="{91240B29-F687-4f45-9708-019B960494DF}">
-                <a14:hiddenLine xmlns:a14="http://schemas.microsoft.com/office/drawing/2010/main" xmlns="" w="9525">
+                <a14:hiddenLine xmlns="" xmlns:a14="http://schemas.microsoft.com/office/drawing/2010/main" w="9525">
                   <a:solidFill>
                     <a:srgbClr val="000000"/>
                   </a:solidFill>
@@ -3086,7 +3086,7 @@
             </a:ln>
             <a:extLst>
               <a:ext uri="{91240B29-F687-4f45-9708-019B960494DF}">
-                <a14:hiddenLine xmlns:a14="http://schemas.microsoft.com/office/drawing/2010/main" xmlns="" w="9525">
+                <a14:hiddenLine xmlns="" xmlns:a14="http://schemas.microsoft.com/office/drawing/2010/main" w="9525">
                   <a:solidFill>
                     <a:srgbClr val="000000"/>
                   </a:solidFill>
@@ -3176,7 +3176,7 @@
             </a:ln>
             <a:extLst>
               <a:ext uri="{91240B29-F687-4f45-9708-019B960494DF}">
-                <a14:hiddenLine xmlns:a14="http://schemas.microsoft.com/office/drawing/2010/main" xmlns="" w="9525">
+                <a14:hiddenLine xmlns="" xmlns:a14="http://schemas.microsoft.com/office/drawing/2010/main" w="9525">
                   <a:solidFill>
                     <a:srgbClr val="000000"/>
                   </a:solidFill>
@@ -3210,7 +3210,7 @@
             </a:ln>
             <a:extLst>
               <a:ext uri="{91240B29-F687-4f45-9708-019B960494DF}">
-                <a14:hiddenLine xmlns:a14="http://schemas.microsoft.com/office/drawing/2010/main" xmlns="" w="9525">
+                <a14:hiddenLine xmlns="" xmlns:a14="http://schemas.microsoft.com/office/drawing/2010/main" w="9525">
                   <a:solidFill>
                     <a:srgbClr val="000000"/>
                   </a:solidFill>
@@ -3275,7 +3275,7 @@
             </a:ln>
             <a:extLst>
               <a:ext uri="{91240B29-F687-4f45-9708-019B960494DF}">
-                <a14:hiddenLine xmlns:a14="http://schemas.microsoft.com/office/drawing/2010/main" xmlns="" w="9525">
+                <a14:hiddenLine xmlns="" xmlns:a14="http://schemas.microsoft.com/office/drawing/2010/main" w="9525">
                   <a:solidFill>
                     <a:srgbClr val="000000"/>
                   </a:solidFill>
@@ -3365,7 +3365,7 @@
             </a:ln>
             <a:extLst>
               <a:ext uri="{91240B29-F687-4f45-9708-019B960494DF}">
-                <a14:hiddenLine xmlns:a14="http://schemas.microsoft.com/office/drawing/2010/main" xmlns="" w="9525">
+                <a14:hiddenLine xmlns="" xmlns:a14="http://schemas.microsoft.com/office/drawing/2010/main" w="9525">
                   <a:solidFill>
                     <a:srgbClr val="000000"/>
                   </a:solidFill>
@@ -3427,7 +3427,7 @@
             </a:ln>
             <a:extLst>
               <a:ext uri="{91240B29-F687-4f45-9708-019B960494DF}">
-                <a14:hiddenLine xmlns:a14="http://schemas.microsoft.com/office/drawing/2010/main" xmlns="" w="9525">
+                <a14:hiddenLine xmlns="" xmlns:a14="http://schemas.microsoft.com/office/drawing/2010/main" w="9525">
                   <a:solidFill>
                     <a:srgbClr val="000000"/>
                   </a:solidFill>
@@ -3517,7 +3517,7 @@
             </a:ln>
             <a:extLst>
               <a:ext uri="{91240B29-F687-4f45-9708-019B960494DF}">
-                <a14:hiddenLine xmlns:a14="http://schemas.microsoft.com/office/drawing/2010/main" xmlns="" w="9525">
+                <a14:hiddenLine xmlns="" xmlns:a14="http://schemas.microsoft.com/office/drawing/2010/main" w="9525">
                   <a:solidFill>
                     <a:srgbClr val="000000"/>
                   </a:solidFill>
@@ -3607,7 +3607,7 @@
             </a:ln>
             <a:extLst>
               <a:ext uri="{91240B29-F687-4f45-9708-019B960494DF}">
-                <a14:hiddenLine xmlns:a14="http://schemas.microsoft.com/office/drawing/2010/main" xmlns="" w="9525">
+                <a14:hiddenLine xmlns="" xmlns:a14="http://schemas.microsoft.com/office/drawing/2010/main" w="9525">
                   <a:solidFill>
                     <a:srgbClr val="000000"/>
                   </a:solidFill>
@@ -3672,7 +3672,7 @@
             </a:ln>
             <a:extLst>
               <a:ext uri="{91240B29-F687-4f45-9708-019B960494DF}">
-                <a14:hiddenLine xmlns:a14="http://schemas.microsoft.com/office/drawing/2010/main" xmlns="" w="9525">
+                <a14:hiddenLine xmlns="" xmlns:a14="http://schemas.microsoft.com/office/drawing/2010/main" w="9525">
                   <a:solidFill>
                     <a:srgbClr val="000000"/>
                   </a:solidFill>
@@ -3734,7 +3734,7 @@
             </a:ln>
             <a:extLst>
               <a:ext uri="{91240B29-F687-4f45-9708-019B960494DF}">
-                <a14:hiddenLine xmlns:a14="http://schemas.microsoft.com/office/drawing/2010/main" xmlns="" w="9525">
+                <a14:hiddenLine xmlns="" xmlns:a14="http://schemas.microsoft.com/office/drawing/2010/main" w="9525">
                   <a:solidFill>
                     <a:srgbClr val="000000"/>
                   </a:solidFill>
@@ -3824,7 +3824,7 @@
             </a:ln>
             <a:extLst>
               <a:ext uri="{91240B29-F687-4f45-9708-019B960494DF}">
-                <a14:hiddenLine xmlns:a14="http://schemas.microsoft.com/office/drawing/2010/main" xmlns="" w="9525">
+                <a14:hiddenLine xmlns="" xmlns:a14="http://schemas.microsoft.com/office/drawing/2010/main" w="9525">
                   <a:solidFill>
                     <a:srgbClr val="000000"/>
                   </a:solidFill>
@@ -3914,7 +3914,7 @@
             </a:ln>
             <a:extLst>
               <a:ext uri="{91240B29-F687-4f45-9708-019B960494DF}">
-                <a14:hiddenLine xmlns:a14="http://schemas.microsoft.com/office/drawing/2010/main" xmlns="" w="9525">
+                <a14:hiddenLine xmlns="" xmlns:a14="http://schemas.microsoft.com/office/drawing/2010/main" w="9525">
                   <a:solidFill>
                     <a:srgbClr val="000000"/>
                   </a:solidFill>
@@ -3976,7 +3976,7 @@
             </a:ln>
             <a:extLst>
               <a:ext uri="{91240B29-F687-4f45-9708-019B960494DF}">
-                <a14:hiddenLine xmlns:a14="http://schemas.microsoft.com/office/drawing/2010/main" xmlns="" w="9525">
+                <a14:hiddenLine xmlns="" xmlns:a14="http://schemas.microsoft.com/office/drawing/2010/main" w="9525">
                   <a:solidFill>
                     <a:srgbClr val="000000"/>
                   </a:solidFill>
@@ -4096,7 +4096,7 @@
             </a:ln>
             <a:extLst>
               <a:ext uri="{91240B29-F687-4f45-9708-019B960494DF}">
-                <a14:hiddenLine xmlns:a14="http://schemas.microsoft.com/office/drawing/2010/main" xmlns="" w="9525">
+                <a14:hiddenLine xmlns="" xmlns:a14="http://schemas.microsoft.com/office/drawing/2010/main" w="9525">
                   <a:solidFill>
                     <a:srgbClr val="000000"/>
                   </a:solidFill>
@@ -4164,7 +4164,7 @@
             </a:ln>
             <a:extLst>
               <a:ext uri="{91240B29-F687-4f45-9708-019B960494DF}">
-                <a14:hiddenLine xmlns:a14="http://schemas.microsoft.com/office/drawing/2010/main" xmlns="" w="9525">
+                <a14:hiddenLine xmlns="" xmlns:a14="http://schemas.microsoft.com/office/drawing/2010/main" w="9525">
                   <a:solidFill>
                     <a:srgbClr val="000000"/>
                   </a:solidFill>
@@ -4254,7 +4254,7 @@
             </a:ln>
             <a:extLst>
               <a:ext uri="{91240B29-F687-4f45-9708-019B960494DF}">
-                <a14:hiddenLine xmlns:a14="http://schemas.microsoft.com/office/drawing/2010/main" xmlns="" w="9525">
+                <a14:hiddenLine xmlns="" xmlns:a14="http://schemas.microsoft.com/office/drawing/2010/main" w="9525">
                   <a:solidFill>
                     <a:srgbClr val="000000"/>
                   </a:solidFill>
@@ -4394,7 +4394,7 @@
           <a:p>
             <a:fld id="{3B57195E-6F70-4CDB-8628-8204974371BE}" type="datetimeFigureOut">
               <a:rPr lang="fr-FR" smtClean="0"/>
-              <a:t>11/02/2019</a:t>
+              <a:t>04/03/2019</a:t>
             </a:fld>
             <a:endParaRPr lang="fr-FR"/>
           </a:p>
@@ -4661,7 +4661,7 @@
           <a:p>
             <a:fld id="{3B57195E-6F70-4CDB-8628-8204974371BE}" type="datetimeFigureOut">
               <a:rPr lang="fr-FR" smtClean="0"/>
-              <a:t>11/02/2019</a:t>
+              <a:t>04/03/2019</a:t>
             </a:fld>
             <a:endParaRPr lang="fr-FR"/>
           </a:p>
@@ -4857,7 +4857,7 @@
           <a:p>
             <a:fld id="{3B57195E-6F70-4CDB-8628-8204974371BE}" type="datetimeFigureOut">
               <a:rPr lang="fr-FR" smtClean="0"/>
-              <a:t>11/02/2019</a:t>
+              <a:t>04/03/2019</a:t>
             </a:fld>
             <a:endParaRPr lang="fr-FR"/>
           </a:p>
@@ -5120,7 +5120,7 @@
           <a:p>
             <a:fld id="{3B57195E-6F70-4CDB-8628-8204974371BE}" type="datetimeFigureOut">
               <a:rPr lang="fr-FR" smtClean="0"/>
-              <a:t>11/02/2019</a:t>
+              <a:t>04/03/2019</a:t>
             </a:fld>
             <a:endParaRPr lang="fr-FR"/>
           </a:p>
@@ -5554,7 +5554,7 @@
           <a:p>
             <a:fld id="{3B57195E-6F70-4CDB-8628-8204974371BE}" type="datetimeFigureOut">
               <a:rPr lang="fr-FR" smtClean="0"/>
-              <a:t>11/02/2019</a:t>
+              <a:t>04/03/2019</a:t>
             </a:fld>
             <a:endParaRPr lang="fr-FR"/>
           </a:p>
@@ -6100,7 +6100,7 @@
           <a:p>
             <a:fld id="{3B57195E-6F70-4CDB-8628-8204974371BE}" type="datetimeFigureOut">
               <a:rPr lang="fr-FR" smtClean="0"/>
-              <a:t>11/02/2019</a:t>
+              <a:t>04/03/2019</a:t>
             </a:fld>
             <a:endParaRPr lang="fr-FR"/>
           </a:p>
@@ -6820,7 +6820,7 @@
           <a:p>
             <a:fld id="{3B57195E-6F70-4CDB-8628-8204974371BE}" type="datetimeFigureOut">
               <a:rPr lang="fr-FR" smtClean="0"/>
-              <a:t>11/02/2019</a:t>
+              <a:t>04/03/2019</a:t>
             </a:fld>
             <a:endParaRPr lang="fr-FR"/>
           </a:p>
@@ -6990,7 +6990,7 @@
           <a:p>
             <a:fld id="{3B57195E-6F70-4CDB-8628-8204974371BE}" type="datetimeFigureOut">
               <a:rPr lang="fr-FR" smtClean="0"/>
-              <a:t>11/02/2019</a:t>
+              <a:t>04/03/2019</a:t>
             </a:fld>
             <a:endParaRPr lang="fr-FR"/>
           </a:p>
@@ -7170,7 +7170,7 @@
           <a:p>
             <a:fld id="{3B57195E-6F70-4CDB-8628-8204974371BE}" type="datetimeFigureOut">
               <a:rPr lang="fr-FR" smtClean="0"/>
-              <a:t>11/02/2019</a:t>
+              <a:t>04/03/2019</a:t>
             </a:fld>
             <a:endParaRPr lang="fr-FR"/>
           </a:p>
@@ -7340,7 +7340,7 @@
           <a:p>
             <a:fld id="{3B57195E-6F70-4CDB-8628-8204974371BE}" type="datetimeFigureOut">
               <a:rPr lang="fr-FR" smtClean="0"/>
-              <a:t>11/02/2019</a:t>
+              <a:t>04/03/2019</a:t>
             </a:fld>
             <a:endParaRPr lang="fr-FR"/>
           </a:p>
@@ -7590,7 +7590,7 @@
           <a:p>
             <a:fld id="{3B57195E-6F70-4CDB-8628-8204974371BE}" type="datetimeFigureOut">
               <a:rPr lang="fr-FR" smtClean="0"/>
-              <a:t>11/02/2019</a:t>
+              <a:t>04/03/2019</a:t>
             </a:fld>
             <a:endParaRPr lang="fr-FR"/>
           </a:p>
@@ -7822,7 +7822,7 @@
           <a:p>
             <a:fld id="{3B57195E-6F70-4CDB-8628-8204974371BE}" type="datetimeFigureOut">
               <a:rPr lang="fr-FR" smtClean="0"/>
-              <a:t>11/02/2019</a:t>
+              <a:t>04/03/2019</a:t>
             </a:fld>
             <a:endParaRPr lang="fr-FR"/>
           </a:p>
@@ -8203,7 +8203,7 @@
           <a:p>
             <a:fld id="{3B57195E-6F70-4CDB-8628-8204974371BE}" type="datetimeFigureOut">
               <a:rPr lang="fr-FR" smtClean="0"/>
-              <a:t>11/02/2019</a:t>
+              <a:t>04/03/2019</a:t>
             </a:fld>
             <a:endParaRPr lang="fr-FR"/>
           </a:p>
@@ -8321,7 +8321,7 @@
           <a:p>
             <a:fld id="{3B57195E-6F70-4CDB-8628-8204974371BE}" type="datetimeFigureOut">
               <a:rPr lang="fr-FR" smtClean="0"/>
-              <a:t>11/02/2019</a:t>
+              <a:t>04/03/2019</a:t>
             </a:fld>
             <a:endParaRPr lang="fr-FR"/>
           </a:p>
@@ -8416,7 +8416,7 @@
           <a:p>
             <a:fld id="{3B57195E-6F70-4CDB-8628-8204974371BE}" type="datetimeFigureOut">
               <a:rPr lang="fr-FR" smtClean="0"/>
-              <a:t>11/02/2019</a:t>
+              <a:t>04/03/2019</a:t>
             </a:fld>
             <a:endParaRPr lang="fr-FR"/>
           </a:p>
@@ -8665,7 +8665,7 @@
           <a:p>
             <a:fld id="{3B57195E-6F70-4CDB-8628-8204974371BE}" type="datetimeFigureOut">
               <a:rPr lang="fr-FR" smtClean="0"/>
-              <a:t>11/02/2019</a:t>
+              <a:t>04/03/2019</a:t>
             </a:fld>
             <a:endParaRPr lang="fr-FR"/>
           </a:p>
@@ -8945,7 +8945,7 @@
           <a:p>
             <a:fld id="{3B57195E-6F70-4CDB-8628-8204974371BE}" type="datetimeFigureOut">
               <a:rPr lang="fr-FR" smtClean="0"/>
-              <a:t>11/02/2019</a:t>
+              <a:t>04/03/2019</a:t>
             </a:fld>
             <a:endParaRPr lang="fr-FR"/>
           </a:p>
@@ -9061,7 +9061,7 @@
           <a:noFill/>
           <a:extLst>
             <a:ext uri="{909E8E84-426E-40dd-AFC4-6F175D3DCCD1}">
-              <a14:hiddenFill xmlns:a14="http://schemas.microsoft.com/office/drawing/2010/main" xmlns="">
+              <a14:hiddenFill xmlns="" xmlns:a14="http://schemas.microsoft.com/office/drawing/2010/main">
                 <a:solidFill>
                   <a:srgbClr val="FFFFFF"/>
                 </a:solidFill>
@@ -9135,7 +9135,7 @@
               </a:ln>
               <a:extLst>
                 <a:ext uri="{91240B29-F687-4f45-9708-019B960494DF}">
-                  <a14:hiddenLine xmlns:a14="http://schemas.microsoft.com/office/drawing/2010/main" xmlns="" w="9525">
+                  <a14:hiddenLine xmlns="" xmlns:a14="http://schemas.microsoft.com/office/drawing/2010/main" w="9525">
                     <a:solidFill>
                       <a:srgbClr val="000000"/>
                     </a:solidFill>
@@ -9225,7 +9225,7 @@
               </a:ln>
               <a:extLst>
                 <a:ext uri="{91240B29-F687-4f45-9708-019B960494DF}">
-                  <a14:hiddenLine xmlns:a14="http://schemas.microsoft.com/office/drawing/2010/main" xmlns="" w="9525">
+                  <a14:hiddenLine xmlns="" xmlns:a14="http://schemas.microsoft.com/office/drawing/2010/main" w="9525">
                     <a:solidFill>
                       <a:srgbClr val="000000"/>
                     </a:solidFill>
@@ -9315,7 +9315,7 @@
               </a:ln>
               <a:extLst>
                 <a:ext uri="{91240B29-F687-4f45-9708-019B960494DF}">
-                  <a14:hiddenLine xmlns:a14="http://schemas.microsoft.com/office/drawing/2010/main" xmlns="" w="9525">
+                  <a14:hiddenLine xmlns="" xmlns:a14="http://schemas.microsoft.com/office/drawing/2010/main" w="9525">
                     <a:solidFill>
                       <a:srgbClr val="000000"/>
                     </a:solidFill>
@@ -9377,7 +9377,7 @@
               </a:ln>
               <a:extLst>
                 <a:ext uri="{91240B29-F687-4f45-9708-019B960494DF}">
-                  <a14:hiddenLine xmlns:a14="http://schemas.microsoft.com/office/drawing/2010/main" xmlns="" w="9525">
+                  <a14:hiddenLine xmlns="" xmlns:a14="http://schemas.microsoft.com/office/drawing/2010/main" w="9525">
                     <a:solidFill>
                       <a:srgbClr val="000000"/>
                     </a:solidFill>
@@ -9467,7 +9467,7 @@
               </a:ln>
               <a:extLst>
                 <a:ext uri="{91240B29-F687-4f45-9708-019B960494DF}">
-                  <a14:hiddenLine xmlns:a14="http://schemas.microsoft.com/office/drawing/2010/main" xmlns="" w="9525">
+                  <a14:hiddenLine xmlns="" xmlns:a14="http://schemas.microsoft.com/office/drawing/2010/main" w="9525">
                     <a:solidFill>
                       <a:srgbClr val="000000"/>
                     </a:solidFill>
@@ -9529,7 +9529,7 @@
               </a:ln>
               <a:extLst>
                 <a:ext uri="{91240B29-F687-4f45-9708-019B960494DF}">
-                  <a14:hiddenLine xmlns:a14="http://schemas.microsoft.com/office/drawing/2010/main" xmlns="" w="9525">
+                  <a14:hiddenLine xmlns="" xmlns:a14="http://schemas.microsoft.com/office/drawing/2010/main" w="9525">
                     <a:solidFill>
                       <a:srgbClr val="000000"/>
                     </a:solidFill>
@@ -9591,7 +9591,7 @@
               </a:ln>
               <a:extLst>
                 <a:ext uri="{91240B29-F687-4f45-9708-019B960494DF}">
-                  <a14:hiddenLine xmlns:a14="http://schemas.microsoft.com/office/drawing/2010/main" xmlns="" w="9525">
+                  <a14:hiddenLine xmlns="" xmlns:a14="http://schemas.microsoft.com/office/drawing/2010/main" w="9525">
                     <a:solidFill>
                       <a:srgbClr val="000000"/>
                     </a:solidFill>
@@ -9681,7 +9681,7 @@
               </a:ln>
               <a:extLst>
                 <a:ext uri="{91240B29-F687-4f45-9708-019B960494DF}">
-                  <a14:hiddenLine xmlns:a14="http://schemas.microsoft.com/office/drawing/2010/main" xmlns="" w="9525">
+                  <a14:hiddenLine xmlns="" xmlns:a14="http://schemas.microsoft.com/office/drawing/2010/main" w="9525">
                     <a:solidFill>
                       <a:srgbClr val="000000"/>
                     </a:solidFill>
@@ -9771,7 +9771,7 @@
               </a:ln>
               <a:extLst>
                 <a:ext uri="{91240B29-F687-4f45-9708-019B960494DF}">
-                  <a14:hiddenLine xmlns:a14="http://schemas.microsoft.com/office/drawing/2010/main" xmlns="" w="9525">
+                  <a14:hiddenLine xmlns="" xmlns:a14="http://schemas.microsoft.com/office/drawing/2010/main" w="9525">
                     <a:solidFill>
                       <a:srgbClr val="000000"/>
                     </a:solidFill>
@@ -9833,7 +9833,7 @@
               </a:ln>
               <a:extLst>
                 <a:ext uri="{91240B29-F687-4f45-9708-019B960494DF}">
-                  <a14:hiddenLine xmlns:a14="http://schemas.microsoft.com/office/drawing/2010/main" xmlns="" w="9525">
+                  <a14:hiddenLine xmlns="" xmlns:a14="http://schemas.microsoft.com/office/drawing/2010/main" w="9525">
                     <a:solidFill>
                       <a:srgbClr val="000000"/>
                     </a:solidFill>
@@ -9943,7 +9943,7 @@
               </a:ln>
               <a:extLst>
                 <a:ext uri="{91240B29-F687-4f45-9708-019B960494DF}">
-                  <a14:hiddenLine xmlns:a14="http://schemas.microsoft.com/office/drawing/2010/main" xmlns="" w="9525">
+                  <a14:hiddenLine xmlns="" xmlns:a14="http://schemas.microsoft.com/office/drawing/2010/main" w="9525">
                     <a:solidFill>
                       <a:srgbClr val="000000"/>
                     </a:solidFill>
@@ -10027,7 +10027,7 @@
               </a:ln>
               <a:extLst>
                 <a:ext uri="{91240B29-F687-4f45-9708-019B960494DF}">
-                  <a14:hiddenLine xmlns:a14="http://schemas.microsoft.com/office/drawing/2010/main" xmlns="" w="9525">
+                  <a14:hiddenLine xmlns="" xmlns:a14="http://schemas.microsoft.com/office/drawing/2010/main" w="9525">
                     <a:solidFill>
                       <a:srgbClr val="000000"/>
                     </a:solidFill>
@@ -10089,7 +10089,7 @@
               </a:ln>
               <a:extLst>
                 <a:ext uri="{91240B29-F687-4f45-9708-019B960494DF}">
-                  <a14:hiddenLine xmlns:a14="http://schemas.microsoft.com/office/drawing/2010/main" xmlns="" w="9525">
+                  <a14:hiddenLine xmlns="" xmlns:a14="http://schemas.microsoft.com/office/drawing/2010/main" w="9525">
                     <a:solidFill>
                       <a:srgbClr val="000000"/>
                     </a:solidFill>
@@ -10151,7 +10151,7 @@
               </a:ln>
               <a:extLst>
                 <a:ext uri="{91240B29-F687-4f45-9708-019B960494DF}">
-                  <a14:hiddenLine xmlns:a14="http://schemas.microsoft.com/office/drawing/2010/main" xmlns="" w="9525">
+                  <a14:hiddenLine xmlns="" xmlns:a14="http://schemas.microsoft.com/office/drawing/2010/main" w="9525">
                     <a:solidFill>
                       <a:srgbClr val="000000"/>
                     </a:solidFill>
@@ -10241,7 +10241,7 @@
               </a:ln>
               <a:extLst>
                 <a:ext uri="{91240B29-F687-4f45-9708-019B960494DF}">
-                  <a14:hiddenLine xmlns:a14="http://schemas.microsoft.com/office/drawing/2010/main" xmlns="" w="9525">
+                  <a14:hiddenLine xmlns="" xmlns:a14="http://schemas.microsoft.com/office/drawing/2010/main" w="9525">
                     <a:solidFill>
                       <a:srgbClr val="000000"/>
                     </a:solidFill>
@@ -10275,7 +10275,7 @@
               </a:ln>
               <a:extLst>
                 <a:ext uri="{91240B29-F687-4f45-9708-019B960494DF}">
-                  <a14:hiddenLine xmlns:a14="http://schemas.microsoft.com/office/drawing/2010/main" xmlns="" w="9525">
+                  <a14:hiddenLine xmlns="" xmlns:a14="http://schemas.microsoft.com/office/drawing/2010/main" w="9525">
                     <a:solidFill>
                       <a:srgbClr val="000000"/>
                     </a:solidFill>
@@ -10340,7 +10340,7 @@
               </a:ln>
               <a:extLst>
                 <a:ext uri="{91240B29-F687-4f45-9708-019B960494DF}">
-                  <a14:hiddenLine xmlns:a14="http://schemas.microsoft.com/office/drawing/2010/main" xmlns="" w="9525">
+                  <a14:hiddenLine xmlns="" xmlns:a14="http://schemas.microsoft.com/office/drawing/2010/main" w="9525">
                     <a:solidFill>
                       <a:srgbClr val="000000"/>
                     </a:solidFill>
@@ -10430,7 +10430,7 @@
               </a:ln>
               <a:extLst>
                 <a:ext uri="{91240B29-F687-4f45-9708-019B960494DF}">
-                  <a14:hiddenLine xmlns:a14="http://schemas.microsoft.com/office/drawing/2010/main" xmlns="" w="9525">
+                  <a14:hiddenLine xmlns="" xmlns:a14="http://schemas.microsoft.com/office/drawing/2010/main" w="9525">
                     <a:solidFill>
                       <a:srgbClr val="000000"/>
                     </a:solidFill>
@@ -10492,7 +10492,7 @@
               </a:ln>
               <a:extLst>
                 <a:ext uri="{91240B29-F687-4f45-9708-019B960494DF}">
-                  <a14:hiddenLine xmlns:a14="http://schemas.microsoft.com/office/drawing/2010/main" xmlns="" w="9525">
+                  <a14:hiddenLine xmlns="" xmlns:a14="http://schemas.microsoft.com/office/drawing/2010/main" w="9525">
                     <a:solidFill>
                       <a:srgbClr val="000000"/>
                     </a:solidFill>
@@ -10582,7 +10582,7 @@
               </a:ln>
               <a:extLst>
                 <a:ext uri="{91240B29-F687-4f45-9708-019B960494DF}">
-                  <a14:hiddenLine xmlns:a14="http://schemas.microsoft.com/office/drawing/2010/main" xmlns="" w="9525">
+                  <a14:hiddenLine xmlns="" xmlns:a14="http://schemas.microsoft.com/office/drawing/2010/main" w="9525">
                     <a:solidFill>
                       <a:srgbClr val="000000"/>
                     </a:solidFill>
@@ -10647,7 +10647,7 @@
               </a:ln>
               <a:extLst>
                 <a:ext uri="{91240B29-F687-4f45-9708-019B960494DF}">
-                  <a14:hiddenLine xmlns:a14="http://schemas.microsoft.com/office/drawing/2010/main" xmlns="" w="9525">
+                  <a14:hiddenLine xmlns="" xmlns:a14="http://schemas.microsoft.com/office/drawing/2010/main" w="9525">
                     <a:solidFill>
                       <a:srgbClr val="000000"/>
                     </a:solidFill>
@@ -10709,7 +10709,7 @@
               </a:ln>
               <a:extLst>
                 <a:ext uri="{91240B29-F687-4f45-9708-019B960494DF}">
-                  <a14:hiddenLine xmlns:a14="http://schemas.microsoft.com/office/drawing/2010/main" xmlns="" w="9525">
+                  <a14:hiddenLine xmlns="" xmlns:a14="http://schemas.microsoft.com/office/drawing/2010/main" w="9525">
                     <a:solidFill>
                       <a:srgbClr val="000000"/>
                     </a:solidFill>
@@ -10799,7 +10799,7 @@
               </a:ln>
               <a:extLst>
                 <a:ext uri="{91240B29-F687-4f45-9708-019B960494DF}">
-                  <a14:hiddenLine xmlns:a14="http://schemas.microsoft.com/office/drawing/2010/main" xmlns="" w="9525">
+                  <a14:hiddenLine xmlns="" xmlns:a14="http://schemas.microsoft.com/office/drawing/2010/main" w="9525">
                     <a:solidFill>
                       <a:srgbClr val="000000"/>
                     </a:solidFill>
@@ -10889,7 +10889,7 @@
               </a:ln>
               <a:extLst>
                 <a:ext uri="{91240B29-F687-4f45-9708-019B960494DF}">
-                  <a14:hiddenLine xmlns:a14="http://schemas.microsoft.com/office/drawing/2010/main" xmlns="" w="9525">
+                  <a14:hiddenLine xmlns="" xmlns:a14="http://schemas.microsoft.com/office/drawing/2010/main" w="9525">
                     <a:solidFill>
                       <a:srgbClr val="000000"/>
                     </a:solidFill>
@@ -10954,7 +10954,7 @@
               </a:ln>
               <a:extLst>
                 <a:ext uri="{91240B29-F687-4f45-9708-019B960494DF}">
-                  <a14:hiddenLine xmlns:a14="http://schemas.microsoft.com/office/drawing/2010/main" xmlns="" w="9525">
+                  <a14:hiddenLine xmlns="" xmlns:a14="http://schemas.microsoft.com/office/drawing/2010/main" w="9525">
                     <a:solidFill>
                       <a:srgbClr val="000000"/>
                     </a:solidFill>
@@ -11074,7 +11074,7 @@
               </a:ln>
               <a:extLst>
                 <a:ext uri="{91240B29-F687-4f45-9708-019B960494DF}">
-                  <a14:hiddenLine xmlns:a14="http://schemas.microsoft.com/office/drawing/2010/main" xmlns="" w="9525">
+                  <a14:hiddenLine xmlns="" xmlns:a14="http://schemas.microsoft.com/office/drawing/2010/main" w="9525">
                     <a:solidFill>
                       <a:srgbClr val="000000"/>
                     </a:solidFill>
@@ -11172,7 +11172,7 @@
               </a:ln>
               <a:extLst>
                 <a:ext uri="{91240B29-F687-4f45-9708-019B960494DF}">
-                  <a14:hiddenLine xmlns:a14="http://schemas.microsoft.com/office/drawing/2010/main" xmlns="" w="9525">
+                  <a14:hiddenLine xmlns="" xmlns:a14="http://schemas.microsoft.com/office/drawing/2010/main" w="9525">
                     <a:solidFill>
                       <a:srgbClr val="000000"/>
                     </a:solidFill>
@@ -11287,7 +11287,7 @@
               </a:ln>
               <a:extLst>
                 <a:ext uri="{91240B29-F687-4f45-9708-019B960494DF}">
-                  <a14:hiddenLine xmlns:a14="http://schemas.microsoft.com/office/drawing/2010/main" xmlns="" w="9525">
+                  <a14:hiddenLine xmlns="" xmlns:a14="http://schemas.microsoft.com/office/drawing/2010/main" w="9525">
                     <a:solidFill>
                       <a:srgbClr val="000000"/>
                     </a:solidFill>
@@ -11377,7 +11377,7 @@
               </a:ln>
               <a:extLst>
                 <a:ext uri="{91240B29-F687-4f45-9708-019B960494DF}">
-                  <a14:hiddenLine xmlns:a14="http://schemas.microsoft.com/office/drawing/2010/main" xmlns="" w="9525">
+                  <a14:hiddenLine xmlns="" xmlns:a14="http://schemas.microsoft.com/office/drawing/2010/main" w="9525">
                     <a:solidFill>
                       <a:srgbClr val="000000"/>
                     </a:solidFill>
@@ -11442,7 +11442,7 @@
               </a:ln>
               <a:extLst>
                 <a:ext uri="{91240B29-F687-4f45-9708-019B960494DF}">
-                  <a14:hiddenLine xmlns:a14="http://schemas.microsoft.com/office/drawing/2010/main" xmlns="" w="9525">
+                  <a14:hiddenLine xmlns="" xmlns:a14="http://schemas.microsoft.com/office/drawing/2010/main" w="9525">
                     <a:solidFill>
                       <a:srgbClr val="000000"/>
                     </a:solidFill>
@@ -11532,7 +11532,7 @@
               </a:ln>
               <a:extLst>
                 <a:ext uri="{91240B29-F687-4f45-9708-019B960494DF}">
-                  <a14:hiddenLine xmlns:a14="http://schemas.microsoft.com/office/drawing/2010/main" xmlns="" w="9525">
+                  <a14:hiddenLine xmlns="" xmlns:a14="http://schemas.microsoft.com/office/drawing/2010/main" w="9525">
                     <a:solidFill>
                       <a:srgbClr val="000000"/>
                     </a:solidFill>
@@ -11600,7 +11600,7 @@
               </a:ln>
               <a:extLst>
                 <a:ext uri="{91240B29-F687-4f45-9708-019B960494DF}">
-                  <a14:hiddenLine xmlns:a14="http://schemas.microsoft.com/office/drawing/2010/main" xmlns="" w="9525">
+                  <a14:hiddenLine xmlns="" xmlns:a14="http://schemas.microsoft.com/office/drawing/2010/main" w="9525">
                     <a:solidFill>
                       <a:srgbClr val="000000"/>
                     </a:solidFill>
@@ -11690,7 +11690,7 @@
               </a:ln>
               <a:extLst>
                 <a:ext uri="{91240B29-F687-4f45-9708-019B960494DF}">
-                  <a14:hiddenLine xmlns:a14="http://schemas.microsoft.com/office/drawing/2010/main" xmlns="" w="9525">
+                  <a14:hiddenLine xmlns="" xmlns:a14="http://schemas.microsoft.com/office/drawing/2010/main" w="9525">
                     <a:solidFill>
                       <a:srgbClr val="000000"/>
                     </a:solidFill>
@@ -11758,7 +11758,7 @@
               </a:ln>
               <a:extLst>
                 <a:ext uri="{91240B29-F687-4f45-9708-019B960494DF}">
-                  <a14:hiddenLine xmlns:a14="http://schemas.microsoft.com/office/drawing/2010/main" xmlns="" w="9525">
+                  <a14:hiddenLine xmlns="" xmlns:a14="http://schemas.microsoft.com/office/drawing/2010/main" w="9525">
                     <a:solidFill>
                       <a:srgbClr val="000000"/>
                     </a:solidFill>
@@ -11848,7 +11848,7 @@
               </a:ln>
               <a:extLst>
                 <a:ext uri="{91240B29-F687-4f45-9708-019B960494DF}">
-                  <a14:hiddenLine xmlns:a14="http://schemas.microsoft.com/office/drawing/2010/main" xmlns="" w="9525">
+                  <a14:hiddenLine xmlns="" xmlns:a14="http://schemas.microsoft.com/office/drawing/2010/main" w="9525">
                     <a:solidFill>
                       <a:srgbClr val="000000"/>
                     </a:solidFill>
@@ -11882,7 +11882,7 @@
               </a:ln>
               <a:extLst>
                 <a:ext uri="{91240B29-F687-4f45-9708-019B960494DF}">
-                  <a14:hiddenLine xmlns:a14="http://schemas.microsoft.com/office/drawing/2010/main" xmlns="" w="9525">
+                  <a14:hiddenLine xmlns="" xmlns:a14="http://schemas.microsoft.com/office/drawing/2010/main" w="9525">
                     <a:solidFill>
                       <a:srgbClr val="000000"/>
                     </a:solidFill>
@@ -12022,7 +12022,7 @@
           <a:p>
             <a:fld id="{3B57195E-6F70-4CDB-8628-8204974371BE}" type="datetimeFigureOut">
               <a:rPr lang="fr-FR" smtClean="0"/>
-              <a:t>11/02/2019</a:t>
+              <a:t>04/03/2019</a:t>
             </a:fld>
             <a:endParaRPr lang="fr-FR"/>
           </a:p>
@@ -12612,7 +12612,7 @@
             <a:noFill/>
             <a:extLst>
               <a:ext uri="{909E8E84-426E-40dd-AFC4-6F175D3DCCD1}">
-                <a14:hiddenFill xmlns="" xmlns:a14="http://schemas.microsoft.com/office/drawing/2010/main" xmlns:p14="http://schemas.microsoft.com/office/powerpoint/2010/main" xmlns:a16="http://schemas.microsoft.com/office/drawing/2014/main">
+                <a14:hiddenFill xmlns:a16="http://schemas.microsoft.com/office/drawing/2014/main" xmlns:p14="http://schemas.microsoft.com/office/powerpoint/2010/main" xmlns:a14="http://schemas.microsoft.com/office/drawing/2010/main" xmlns="">
                   <a:solidFill>
                     <a:srgbClr val="FFFFFF"/>
                   </a:solidFill>
@@ -16735,8 +16735,8 @@
         </p:nvSpPr>
         <p:spPr>
           <a:xfrm>
-            <a:off x="6808368" y="844951"/>
-            <a:ext cx="3976382" cy="3416320"/>
+            <a:off x="7587990" y="476561"/>
+            <a:ext cx="3830965" cy="3416320"/>
           </a:xfrm>
           <a:prstGeom prst="rect">
             <a:avLst/>
@@ -16940,8 +16940,8 @@
         </p:nvSpPr>
         <p:spPr>
           <a:xfrm flipH="1">
-            <a:off x="6266573" y="2812750"/>
-            <a:ext cx="45719" cy="1608248"/>
+            <a:off x="6266572" y="2812750"/>
+            <a:ext cx="45720" cy="1313752"/>
           </a:xfrm>
           <a:prstGeom prst="rect">
             <a:avLst/>
@@ -16994,7 +16994,7 @@
         </p:nvSpPr>
         <p:spPr>
           <a:xfrm>
-            <a:off x="6266572" y="4380710"/>
+            <a:off x="6266572" y="4063355"/>
             <a:ext cx="5925427" cy="63147"/>
           </a:xfrm>
           <a:prstGeom prst="rect">
@@ -17141,7 +17141,7 @@
         </p:nvSpPr>
         <p:spPr>
           <a:xfrm>
-            <a:off x="1275830" y="3513122"/>
+            <a:off x="1275830" y="3472526"/>
             <a:ext cx="6518246" cy="1200329"/>
           </a:xfrm>
           <a:prstGeom prst="rect">
@@ -17267,8 +17267,8 @@
         </p:nvSpPr>
         <p:spPr>
           <a:xfrm flipH="1">
-            <a:off x="6518945" y="4411236"/>
-            <a:ext cx="45719" cy="2446764"/>
+            <a:off x="6518944" y="4126502"/>
+            <a:ext cx="45719" cy="2731498"/>
           </a:xfrm>
           <a:prstGeom prst="rect">
             <a:avLst/>
@@ -17321,7 +17321,7 @@
         </p:nvSpPr>
         <p:spPr>
           <a:xfrm>
-            <a:off x="7093874" y="4569451"/>
+            <a:off x="7093873" y="4154795"/>
             <a:ext cx="4118994" cy="369332"/>
           </a:xfrm>
           <a:prstGeom prst="rect">
@@ -17356,7 +17356,7 @@
         </p:nvSpPr>
         <p:spPr>
           <a:xfrm flipH="1" flipV="1">
-            <a:off x="7009278" y="4735652"/>
+            <a:off x="7009278" y="4312958"/>
             <a:ext cx="84595" cy="87664"/>
           </a:xfrm>
           <a:prstGeom prst="ellipse">
@@ -17393,6 +17393,119 @@
           <a:p>
             <a:pPr algn="ctr"/>
             <a:endParaRPr lang="fr-FR"/>
+          </a:p>
+        </p:txBody>
+      </p:sp>
+      <p:sp>
+        <p:nvSpPr>
+          <p:cNvPr id="19" name="ZoneTexte 18">
+            <a:extLst>
+              <a:ext uri="{FF2B5EF4-FFF2-40B4-BE49-F238E27FC236}">
+                <a16:creationId xmlns:a16="http://schemas.microsoft.com/office/drawing/2014/main" id="{24612995-EEA1-4875-97AA-5837D70E85F2}"/>
+              </a:ext>
+            </a:extLst>
+          </p:cNvPr>
+          <p:cNvSpPr txBox="1"/>
+          <p:nvPr/>
+        </p:nvSpPr>
+        <p:spPr>
+          <a:xfrm>
+            <a:off x="6687294" y="4493265"/>
+            <a:ext cx="6518246" cy="1477328"/>
+          </a:xfrm>
+          <a:prstGeom prst="rect">
+            <a:avLst/>
+          </a:prstGeom>
+          <a:noFill/>
+        </p:spPr>
+        <p:txBody>
+          <a:bodyPr wrap="square" rtlCol="0">
+            <a:spAutoFit/>
+          </a:bodyPr>
+          <a:lstStyle/>
+          <a:p>
+            <a:r>
+              <a:rPr lang="fr-FR" dirty="0"/>
+              <a:t>Eléments allant de 0 à n-1 pour une taille de n</a:t>
+            </a:r>
+          </a:p>
+          <a:p>
+            <a:r>
+              <a:rPr lang="fr-FR" dirty="0"/>
+              <a:t>Unidimensionnel, Multidimensionnel, en escalier</a:t>
+            </a:r>
+          </a:p>
+          <a:p>
+            <a:r>
+              <a:rPr lang="fr-FR" dirty="0"/>
+              <a:t>En escalier : les éléments du tableau n’ont pas la même </a:t>
+            </a:r>
+          </a:p>
+          <a:p>
+            <a:r>
+              <a:rPr lang="fr-FR" dirty="0"/>
+              <a:t>dimension</a:t>
+            </a:r>
+          </a:p>
+          <a:p>
+            <a:endParaRPr lang="fr-FR" dirty="0"/>
+          </a:p>
+        </p:txBody>
+      </p:sp>
+      <p:sp>
+        <p:nvSpPr>
+          <p:cNvPr id="4" name="ZoneTexte 3">
+            <a:extLst>
+              <a:ext uri="{FF2B5EF4-FFF2-40B4-BE49-F238E27FC236}">
+                <a16:creationId xmlns:a16="http://schemas.microsoft.com/office/drawing/2014/main" id="{C9A32F1D-113F-4150-91F3-CDBA1E07E1BC}"/>
+              </a:ext>
+            </a:extLst>
+          </p:cNvPr>
+          <p:cNvSpPr txBox="1"/>
+          <p:nvPr/>
+        </p:nvSpPr>
+        <p:spPr>
+          <a:xfrm>
+            <a:off x="8237021" y="5463071"/>
+            <a:ext cx="3418791" cy="1200329"/>
+          </a:xfrm>
+          <a:prstGeom prst="rect">
+            <a:avLst/>
+          </a:prstGeom>
+          <a:solidFill>
+            <a:schemeClr val="bg1"/>
+          </a:solidFill>
+          <a:ln>
+            <a:solidFill>
+              <a:schemeClr val="tx1"/>
+            </a:solidFill>
+          </a:ln>
+        </p:spPr>
+        <p:txBody>
+          <a:bodyPr wrap="square" rtlCol="0">
+            <a:spAutoFit/>
+          </a:bodyPr>
+          <a:lstStyle/>
+          <a:p>
+            <a:r>
+              <a:rPr lang="fr-FR" dirty="0"/>
+              <a:t>tab[][] a = new tab[2][];</a:t>
+            </a:r>
+          </a:p>
+          <a:p>
+            <a:r>
+              <a:rPr lang="fr-FR" dirty="0"/>
+              <a:t>       a[0] = new tab[3];</a:t>
+            </a:r>
+          </a:p>
+          <a:p>
+            <a:r>
+              <a:rPr lang="fr-FR" dirty="0"/>
+              <a:t>       a[1] = new tab[5];</a:t>
+            </a:r>
+          </a:p>
+          <a:p>
+            <a:endParaRPr lang="fr-FR" dirty="0"/>
           </a:p>
         </p:txBody>
       </p:sp>
@@ -17454,26 +17567,403 @@
       </p:grpSpPr>
       <p:sp>
         <p:nvSpPr>
-          <p:cNvPr id="4" name="Titre 3">
+          <p:cNvPr id="3" name="ZoneTexte 2">
             <a:extLst>
               <a:ext uri="{FF2B5EF4-FFF2-40B4-BE49-F238E27FC236}">
-                <a16:creationId xmlns:a16="http://schemas.microsoft.com/office/drawing/2014/main" id="{3F814E00-E638-4290-A5C4-C890A899C9EC}"/>
+                <a16:creationId xmlns:a16="http://schemas.microsoft.com/office/drawing/2014/main" id="{ED4B8125-0788-48C9-AF64-71EA7B1A4A90}"/>
               </a:ext>
             </a:extLst>
           </p:cNvPr>
-          <p:cNvSpPr>
-            <a:spLocks noGrp="1"/>
-          </p:cNvSpPr>
-          <p:nvPr>
-            <p:ph type="ctrTitle"/>
-          </p:nvPr>
+          <p:cNvSpPr txBox="1"/>
+          <p:nvPr/>
         </p:nvSpPr>
-        <p:spPr/>
+        <p:spPr>
+          <a:xfrm>
+            <a:off x="2585938" y="160495"/>
+            <a:ext cx="4118994" cy="369332"/>
+          </a:xfrm>
+          <a:prstGeom prst="rect">
+            <a:avLst/>
+          </a:prstGeom>
+          <a:noFill/>
+        </p:spPr>
         <p:txBody>
-          <a:bodyPr/>
+          <a:bodyPr wrap="square" rtlCol="0">
+            <a:spAutoFit/>
+          </a:bodyPr>
           <a:lstStyle/>
           <a:p>
+            <a:r>
+              <a:rPr lang="fr-FR" dirty="0"/>
+              <a:t>Délégués</a:t>
+            </a:r>
+          </a:p>
+        </p:txBody>
+      </p:sp>
+      <p:sp>
+        <p:nvSpPr>
+          <p:cNvPr id="5" name="Ellipse 4">
+            <a:extLst>
+              <a:ext uri="{FF2B5EF4-FFF2-40B4-BE49-F238E27FC236}">
+                <a16:creationId xmlns:a16="http://schemas.microsoft.com/office/drawing/2014/main" id="{1608EEDF-2B54-4748-96F9-FD846C2B1E6F}"/>
+              </a:ext>
+            </a:extLst>
+          </p:cNvPr>
+          <p:cNvSpPr/>
+          <p:nvPr/>
+        </p:nvSpPr>
+        <p:spPr>
+          <a:xfrm flipH="1" flipV="1">
+            <a:off x="2501342" y="326696"/>
+            <a:ext cx="84595" cy="87664"/>
+          </a:xfrm>
+          <a:prstGeom prst="ellipse">
+            <a:avLst/>
+          </a:prstGeom>
+          <a:solidFill>
+            <a:schemeClr val="tx2"/>
+          </a:solidFill>
+          <a:ln>
+            <a:solidFill>
+              <a:schemeClr val="bg2"/>
+            </a:solidFill>
+          </a:ln>
+        </p:spPr>
+        <p:style>
+          <a:lnRef idx="2">
+            <a:schemeClr val="accent1">
+              <a:shade val="50000"/>
+            </a:schemeClr>
+          </a:lnRef>
+          <a:fillRef idx="1">
+            <a:schemeClr val="accent1"/>
+          </a:fillRef>
+          <a:effectRef idx="0">
+            <a:schemeClr val="accent1"/>
+          </a:effectRef>
+          <a:fontRef idx="minor">
+            <a:schemeClr val="lt1"/>
+          </a:fontRef>
+        </p:style>
+        <p:txBody>
+          <a:bodyPr rtlCol="0" anchor="ctr"/>
+          <a:lstStyle/>
+          <a:p>
+            <a:pPr algn="ctr"/>
             <a:endParaRPr lang="fr-FR"/>
+          </a:p>
+        </p:txBody>
+      </p:sp>
+      <p:sp>
+        <p:nvSpPr>
+          <p:cNvPr id="2" name="ZoneTexte 1">
+            <a:extLst>
+              <a:ext uri="{FF2B5EF4-FFF2-40B4-BE49-F238E27FC236}">
+                <a16:creationId xmlns:a16="http://schemas.microsoft.com/office/drawing/2014/main" id="{D78AEC5E-CD8C-4430-9768-FF5AB7E1812C}"/>
+              </a:ext>
+            </a:extLst>
+          </p:cNvPr>
+          <p:cNvSpPr txBox="1"/>
+          <p:nvPr/>
+        </p:nvSpPr>
+        <p:spPr>
+          <a:xfrm>
+            <a:off x="2424023" y="785004"/>
+            <a:ext cx="8436634" cy="369332"/>
+          </a:xfrm>
+          <a:prstGeom prst="rect">
+            <a:avLst/>
+          </a:prstGeom>
+          <a:noFill/>
+        </p:spPr>
+        <p:txBody>
+          <a:bodyPr wrap="square" rtlCol="0">
+            <a:spAutoFit/>
+          </a:bodyPr>
+          <a:lstStyle/>
+          <a:p>
+            <a:r>
+              <a:rPr lang="fr-FR" dirty="0"/>
+              <a:t>Variables qui pointent vers des méthodes contenant la même signature.</a:t>
+            </a:r>
+          </a:p>
+        </p:txBody>
+      </p:sp>
+      <p:sp>
+        <p:nvSpPr>
+          <p:cNvPr id="6" name="ZoneTexte 5">
+            <a:extLst>
+              <a:ext uri="{FF2B5EF4-FFF2-40B4-BE49-F238E27FC236}">
+                <a16:creationId xmlns:a16="http://schemas.microsoft.com/office/drawing/2014/main" id="{B505FE96-029E-4BF7-AAEC-D1024C54BE73}"/>
+              </a:ext>
+            </a:extLst>
+          </p:cNvPr>
+          <p:cNvSpPr txBox="1"/>
+          <p:nvPr/>
+        </p:nvSpPr>
+        <p:spPr>
+          <a:xfrm>
+            <a:off x="4520242" y="1249207"/>
+            <a:ext cx="4244195" cy="369332"/>
+          </a:xfrm>
+          <a:prstGeom prst="rect">
+            <a:avLst/>
+          </a:prstGeom>
+          <a:solidFill>
+            <a:schemeClr val="bg1"/>
+          </a:solidFill>
+          <a:ln>
+            <a:solidFill>
+              <a:schemeClr val="tx1"/>
+            </a:solidFill>
+          </a:ln>
+        </p:spPr>
+        <p:txBody>
+          <a:bodyPr wrap="square" rtlCol="0">
+            <a:spAutoFit/>
+          </a:bodyPr>
+          <a:lstStyle/>
+          <a:p>
+            <a:r>
+              <a:rPr lang="en-US" dirty="0"/>
+              <a:t>delegate string </a:t>
+            </a:r>
+            <a:r>
+              <a:rPr lang="en-US" dirty="0" err="1"/>
+              <a:t>ActionOnString</a:t>
+            </a:r>
+            <a:r>
+              <a:rPr lang="en-US" dirty="0"/>
+              <a:t>(string text);</a:t>
+            </a:r>
+            <a:endParaRPr lang="fr-FR" dirty="0"/>
+          </a:p>
+        </p:txBody>
+      </p:sp>
+      <p:sp>
+        <p:nvSpPr>
+          <p:cNvPr id="7" name="Flèche : droite 6">
+            <a:extLst>
+              <a:ext uri="{FF2B5EF4-FFF2-40B4-BE49-F238E27FC236}">
+                <a16:creationId xmlns:a16="http://schemas.microsoft.com/office/drawing/2014/main" id="{3BD56767-FB4A-495C-851A-4B413C82892A}"/>
+              </a:ext>
+            </a:extLst>
+          </p:cNvPr>
+          <p:cNvSpPr/>
+          <p:nvPr/>
+        </p:nvSpPr>
+        <p:spPr>
+          <a:xfrm>
+            <a:off x="3243532" y="1975449"/>
+            <a:ext cx="163902" cy="155275"/>
+          </a:xfrm>
+          <a:prstGeom prst="rightArrow">
+            <a:avLst/>
+          </a:prstGeom>
+        </p:spPr>
+        <p:style>
+          <a:lnRef idx="2">
+            <a:schemeClr val="accent1">
+              <a:shade val="50000"/>
+            </a:schemeClr>
+          </a:lnRef>
+          <a:fillRef idx="1">
+            <a:schemeClr val="accent1"/>
+          </a:fillRef>
+          <a:effectRef idx="0">
+            <a:schemeClr val="accent1"/>
+          </a:effectRef>
+          <a:fontRef idx="minor">
+            <a:schemeClr val="lt1"/>
+          </a:fontRef>
+        </p:style>
+        <p:txBody>
+          <a:bodyPr rtlCol="0" anchor="ctr"/>
+          <a:lstStyle/>
+          <a:p>
+            <a:pPr algn="ctr"/>
+            <a:endParaRPr lang="fr-FR"/>
+          </a:p>
+        </p:txBody>
+      </p:sp>
+      <p:sp>
+        <p:nvSpPr>
+          <p:cNvPr id="8" name="ZoneTexte 7">
+            <a:extLst>
+              <a:ext uri="{FF2B5EF4-FFF2-40B4-BE49-F238E27FC236}">
+                <a16:creationId xmlns:a16="http://schemas.microsoft.com/office/drawing/2014/main" id="{FC58903A-C8B0-41FB-AE68-40C3CCEC7FC2}"/>
+              </a:ext>
+            </a:extLst>
+          </p:cNvPr>
+          <p:cNvSpPr txBox="1"/>
+          <p:nvPr/>
+        </p:nvSpPr>
+        <p:spPr>
+          <a:xfrm>
+            <a:off x="3476445" y="1863306"/>
+            <a:ext cx="6443932" cy="369332"/>
+          </a:xfrm>
+          <a:prstGeom prst="rect">
+            <a:avLst/>
+          </a:prstGeom>
+          <a:noFill/>
+        </p:spPr>
+        <p:txBody>
+          <a:bodyPr wrap="square" rtlCol="0">
+            <a:spAutoFit/>
+          </a:bodyPr>
+          <a:lstStyle/>
+          <a:p>
+            <a:r>
+              <a:rPr lang="fr-FR" dirty="0"/>
+              <a:t>Délégué qui prend en compte un string et renvoie un string</a:t>
+            </a:r>
+          </a:p>
+        </p:txBody>
+      </p:sp>
+      <p:sp>
+        <p:nvSpPr>
+          <p:cNvPr id="9" name="ZoneTexte 8">
+            <a:extLst>
+              <a:ext uri="{FF2B5EF4-FFF2-40B4-BE49-F238E27FC236}">
+                <a16:creationId xmlns:a16="http://schemas.microsoft.com/office/drawing/2014/main" id="{829D9309-0FA9-4BA7-84F1-7AEEF9414DC9}"/>
+              </a:ext>
+            </a:extLst>
+          </p:cNvPr>
+          <p:cNvSpPr txBox="1"/>
+          <p:nvPr/>
+        </p:nvSpPr>
+        <p:spPr>
+          <a:xfrm>
+            <a:off x="3476445" y="3063815"/>
+            <a:ext cx="8436634" cy="923330"/>
+          </a:xfrm>
+          <a:prstGeom prst="rect">
+            <a:avLst/>
+          </a:prstGeom>
+          <a:noFill/>
+        </p:spPr>
+        <p:txBody>
+          <a:bodyPr wrap="square" rtlCol="0">
+            <a:spAutoFit/>
+          </a:bodyPr>
+          <a:lstStyle/>
+          <a:p>
+            <a:r>
+              <a:rPr lang="fr-FR" dirty="0"/>
+              <a:t>Variables qui pointent vers des méthodes contenant la même signature.</a:t>
+            </a:r>
+          </a:p>
+          <a:p>
+            <a:r>
+              <a:rPr lang="fr-FR" dirty="0"/>
+              <a:t>Affichage Classique doit être une méthode qui prend en argument un String et renvoie également </a:t>
+            </a:r>
+            <a:r>
+              <a:rPr lang="fr-FR"/>
+              <a:t>un string.</a:t>
+            </a:r>
+            <a:endParaRPr lang="fr-FR" dirty="0"/>
+          </a:p>
+        </p:txBody>
+      </p:sp>
+      <p:sp>
+        <p:nvSpPr>
+          <p:cNvPr id="10" name="Flèche : droite 9">
+            <a:extLst>
+              <a:ext uri="{FF2B5EF4-FFF2-40B4-BE49-F238E27FC236}">
+                <a16:creationId xmlns:a16="http://schemas.microsoft.com/office/drawing/2014/main" id="{BA75ECE9-4607-49B0-B895-C4F5C116473F}"/>
+              </a:ext>
+            </a:extLst>
+          </p:cNvPr>
+          <p:cNvSpPr/>
+          <p:nvPr/>
+        </p:nvSpPr>
+        <p:spPr>
+          <a:xfrm>
+            <a:off x="3243532" y="3170843"/>
+            <a:ext cx="163902" cy="155275"/>
+          </a:xfrm>
+          <a:prstGeom prst="rightArrow">
+            <a:avLst/>
+          </a:prstGeom>
+        </p:spPr>
+        <p:style>
+          <a:lnRef idx="2">
+            <a:schemeClr val="accent1">
+              <a:shade val="50000"/>
+            </a:schemeClr>
+          </a:lnRef>
+          <a:fillRef idx="1">
+            <a:schemeClr val="accent1"/>
+          </a:fillRef>
+          <a:effectRef idx="0">
+            <a:schemeClr val="accent1"/>
+          </a:effectRef>
+          <a:fontRef idx="minor">
+            <a:schemeClr val="lt1"/>
+          </a:fontRef>
+        </p:style>
+        <p:txBody>
+          <a:bodyPr rtlCol="0" anchor="ctr"/>
+          <a:lstStyle/>
+          <a:p>
+            <a:pPr algn="ctr"/>
+            <a:endParaRPr lang="fr-FR"/>
+          </a:p>
+        </p:txBody>
+      </p:sp>
+      <p:sp>
+        <p:nvSpPr>
+          <p:cNvPr id="11" name="ZoneTexte 10">
+            <a:extLst>
+              <a:ext uri="{FF2B5EF4-FFF2-40B4-BE49-F238E27FC236}">
+                <a16:creationId xmlns:a16="http://schemas.microsoft.com/office/drawing/2014/main" id="{6A0E2407-3731-4E1E-8F01-5EC1E31F7FFC}"/>
+              </a:ext>
+            </a:extLst>
+          </p:cNvPr>
+          <p:cNvSpPr txBox="1"/>
+          <p:nvPr/>
+        </p:nvSpPr>
+        <p:spPr>
+          <a:xfrm>
+            <a:off x="4520241" y="2449716"/>
+            <a:ext cx="4244195" cy="369332"/>
+          </a:xfrm>
+          <a:prstGeom prst="rect">
+            <a:avLst/>
+          </a:prstGeom>
+          <a:solidFill>
+            <a:schemeClr val="bg1"/>
+          </a:solidFill>
+          <a:ln>
+            <a:solidFill>
+              <a:schemeClr val="tx1"/>
+            </a:solidFill>
+          </a:ln>
+        </p:spPr>
+        <p:txBody>
+          <a:bodyPr wrap="square" rtlCol="0">
+            <a:spAutoFit/>
+          </a:bodyPr>
+          <a:lstStyle/>
+          <a:p>
+            <a:r>
+              <a:rPr lang="fr-FR" dirty="0" err="1"/>
+              <a:t>ActionOnString</a:t>
+            </a:r>
+            <a:r>
+              <a:rPr lang="fr-FR" dirty="0"/>
+              <a:t> test1 = </a:t>
+            </a:r>
+            <a:r>
+              <a:rPr lang="fr-FR" dirty="0" err="1"/>
+              <a:t>affichageClassique</a:t>
+            </a:r>
+            <a:r>
+              <a:rPr lang="fr-FR" dirty="0"/>
+              <a:t>; </a:t>
+            </a:r>
           </a:p>
         </p:txBody>
       </p:sp>

</xml_diff>

<commit_message>
Sommaire + début du lexique. PW : fin partie délégué
</commit_message>
<xml_diff>
--- a/CoursCS2.pptx
+++ b/CoursCS2.pptx
@@ -168,7 +168,7 @@
           <a:noFill/>
           <a:extLst>
             <a:ext uri="{909E8E84-426E-40dd-AFC4-6F175D3DCCD1}">
-              <a14:hiddenFill xmlns="" xmlns:a14="http://schemas.microsoft.com/office/drawing/2010/main">
+              <a14:hiddenFill xmlns:a14="http://schemas.microsoft.com/office/drawing/2010/main" xmlns="">
                 <a:solidFill>
                   <a:srgbClr val="FFFFFF"/>
                 </a:solidFill>
@@ -228,7 +228,7 @@
             </a:ln>
             <a:extLst>
               <a:ext uri="{91240B29-F687-4f45-9708-019B960494DF}">
-                <a14:hiddenLine xmlns="" xmlns:a14="http://schemas.microsoft.com/office/drawing/2010/main" w="9525">
+                <a14:hiddenLine xmlns:a14="http://schemas.microsoft.com/office/drawing/2010/main" xmlns="" w="9525">
                   <a:solidFill>
                     <a:srgbClr val="000000"/>
                   </a:solidFill>
@@ -318,7 +318,7 @@
             </a:ln>
             <a:extLst>
               <a:ext uri="{91240B29-F687-4f45-9708-019B960494DF}">
-                <a14:hiddenLine xmlns="" xmlns:a14="http://schemas.microsoft.com/office/drawing/2010/main" w="9525">
+                <a14:hiddenLine xmlns:a14="http://schemas.microsoft.com/office/drawing/2010/main" xmlns="" w="9525">
                   <a:solidFill>
                     <a:srgbClr val="000000"/>
                   </a:solidFill>
@@ -408,7 +408,7 @@
             </a:ln>
             <a:extLst>
               <a:ext uri="{91240B29-F687-4f45-9708-019B960494DF}">
-                <a14:hiddenLine xmlns="" xmlns:a14="http://schemas.microsoft.com/office/drawing/2010/main" w="9525">
+                <a14:hiddenLine xmlns:a14="http://schemas.microsoft.com/office/drawing/2010/main" xmlns="" w="9525">
                   <a:solidFill>
                     <a:srgbClr val="000000"/>
                   </a:solidFill>
@@ -442,7 +442,7 @@
             </a:ln>
             <a:extLst>
               <a:ext uri="{91240B29-F687-4f45-9708-019B960494DF}">
-                <a14:hiddenLine xmlns="" xmlns:a14="http://schemas.microsoft.com/office/drawing/2010/main" w="9525">
+                <a14:hiddenLine xmlns:a14="http://schemas.microsoft.com/office/drawing/2010/main" xmlns="" w="9525">
                   <a:solidFill>
                     <a:srgbClr val="000000"/>
                   </a:solidFill>
@@ -532,7 +532,7 @@
             </a:ln>
             <a:extLst>
               <a:ext uri="{91240B29-F687-4f45-9708-019B960494DF}">
-                <a14:hiddenLine xmlns="" xmlns:a14="http://schemas.microsoft.com/office/drawing/2010/main" w="9525">
+                <a14:hiddenLine xmlns:a14="http://schemas.microsoft.com/office/drawing/2010/main" xmlns="" w="9525">
                   <a:solidFill>
                     <a:srgbClr val="000000"/>
                   </a:solidFill>
@@ -594,7 +594,7 @@
             </a:ln>
             <a:extLst>
               <a:ext uri="{91240B29-F687-4f45-9708-019B960494DF}">
-                <a14:hiddenLine xmlns="" xmlns:a14="http://schemas.microsoft.com/office/drawing/2010/main" w="9525">
+                <a14:hiddenLine xmlns:a14="http://schemas.microsoft.com/office/drawing/2010/main" xmlns="" w="9525">
                   <a:solidFill>
                     <a:srgbClr val="000000"/>
                   </a:solidFill>
@@ -656,7 +656,7 @@
             </a:ln>
             <a:extLst>
               <a:ext uri="{91240B29-F687-4f45-9708-019B960494DF}">
-                <a14:hiddenLine xmlns="" xmlns:a14="http://schemas.microsoft.com/office/drawing/2010/main" w="9525">
+                <a14:hiddenLine xmlns:a14="http://schemas.microsoft.com/office/drawing/2010/main" xmlns="" w="9525">
                   <a:solidFill>
                     <a:srgbClr val="000000"/>
                   </a:solidFill>
@@ -746,7 +746,7 @@
             </a:ln>
             <a:extLst>
               <a:ext uri="{91240B29-F687-4f45-9708-019B960494DF}">
-                <a14:hiddenLine xmlns="" xmlns:a14="http://schemas.microsoft.com/office/drawing/2010/main" w="9525">
+                <a14:hiddenLine xmlns:a14="http://schemas.microsoft.com/office/drawing/2010/main" xmlns="" w="9525">
                   <a:solidFill>
                     <a:srgbClr val="000000"/>
                   </a:solidFill>
@@ -808,7 +808,7 @@
             </a:ln>
             <a:extLst>
               <a:ext uri="{91240B29-F687-4f45-9708-019B960494DF}">
-                <a14:hiddenLine xmlns="" xmlns:a14="http://schemas.microsoft.com/office/drawing/2010/main" w="9525">
+                <a14:hiddenLine xmlns:a14="http://schemas.microsoft.com/office/drawing/2010/main" xmlns="" w="9525">
                   <a:solidFill>
                     <a:srgbClr val="000000"/>
                   </a:solidFill>
@@ -870,7 +870,7 @@
             </a:ln>
             <a:extLst>
               <a:ext uri="{91240B29-F687-4f45-9708-019B960494DF}">
-                <a14:hiddenLine xmlns="" xmlns:a14="http://schemas.microsoft.com/office/drawing/2010/main" w="9525">
+                <a14:hiddenLine xmlns:a14="http://schemas.microsoft.com/office/drawing/2010/main" xmlns="" w="9525">
                   <a:solidFill>
                     <a:srgbClr val="000000"/>
                   </a:solidFill>
@@ -960,7 +960,7 @@
             </a:ln>
             <a:extLst>
               <a:ext uri="{91240B29-F687-4f45-9708-019B960494DF}">
-                <a14:hiddenLine xmlns="" xmlns:a14="http://schemas.microsoft.com/office/drawing/2010/main" w="9525">
+                <a14:hiddenLine xmlns:a14="http://schemas.microsoft.com/office/drawing/2010/main" xmlns="" w="9525">
                   <a:solidFill>
                     <a:srgbClr val="000000"/>
                   </a:solidFill>
@@ -1050,7 +1050,7 @@
             </a:ln>
             <a:extLst>
               <a:ext uri="{91240B29-F687-4f45-9708-019B960494DF}">
-                <a14:hiddenLine xmlns="" xmlns:a14="http://schemas.microsoft.com/office/drawing/2010/main" w="9525">
+                <a14:hiddenLine xmlns:a14="http://schemas.microsoft.com/office/drawing/2010/main" xmlns="" w="9525">
                   <a:solidFill>
                     <a:srgbClr val="000000"/>
                   </a:solidFill>
@@ -1112,7 +1112,7 @@
             </a:ln>
             <a:extLst>
               <a:ext uri="{91240B29-F687-4f45-9708-019B960494DF}">
-                <a14:hiddenLine xmlns="" xmlns:a14="http://schemas.microsoft.com/office/drawing/2010/main" w="9525">
+                <a14:hiddenLine xmlns:a14="http://schemas.microsoft.com/office/drawing/2010/main" xmlns="" w="9525">
                   <a:solidFill>
                     <a:srgbClr val="000000"/>
                   </a:solidFill>
@@ -1222,7 +1222,7 @@
             </a:ln>
             <a:extLst>
               <a:ext uri="{91240B29-F687-4f45-9708-019B960494DF}">
-                <a14:hiddenLine xmlns="" xmlns:a14="http://schemas.microsoft.com/office/drawing/2010/main" w="9525">
+                <a14:hiddenLine xmlns:a14="http://schemas.microsoft.com/office/drawing/2010/main" xmlns="" w="9525">
                   <a:solidFill>
                     <a:srgbClr val="000000"/>
                   </a:solidFill>
@@ -1284,7 +1284,7 @@
             </a:ln>
             <a:extLst>
               <a:ext uri="{91240B29-F687-4f45-9708-019B960494DF}">
-                <a14:hiddenLine xmlns="" xmlns:a14="http://schemas.microsoft.com/office/drawing/2010/main" w="9525">
+                <a14:hiddenLine xmlns:a14="http://schemas.microsoft.com/office/drawing/2010/main" xmlns="" w="9525">
                   <a:solidFill>
                     <a:srgbClr val="000000"/>
                   </a:solidFill>
@@ -1374,7 +1374,7 @@
             </a:ln>
             <a:extLst>
               <a:ext uri="{91240B29-F687-4f45-9708-019B960494DF}">
-                <a14:hiddenLine xmlns="" xmlns:a14="http://schemas.microsoft.com/office/drawing/2010/main" w="9525">
+                <a14:hiddenLine xmlns:a14="http://schemas.microsoft.com/office/drawing/2010/main" xmlns="" w="9525">
                   <a:solidFill>
                     <a:srgbClr val="000000"/>
                   </a:solidFill>
@@ -1464,7 +1464,7 @@
             </a:ln>
             <a:extLst>
               <a:ext uri="{91240B29-F687-4f45-9708-019B960494DF}">
-                <a14:hiddenLine xmlns="" xmlns:a14="http://schemas.microsoft.com/office/drawing/2010/main" w="9525">
+                <a14:hiddenLine xmlns:a14="http://schemas.microsoft.com/office/drawing/2010/main" xmlns="" w="9525">
                   <a:solidFill>
                     <a:srgbClr val="000000"/>
                   </a:solidFill>
@@ -1526,7 +1526,7 @@
             </a:ln>
             <a:extLst>
               <a:ext uri="{91240B29-F687-4f45-9708-019B960494DF}">
-                <a14:hiddenLine xmlns="" xmlns:a14="http://schemas.microsoft.com/office/drawing/2010/main" w="9525">
+                <a14:hiddenLine xmlns:a14="http://schemas.microsoft.com/office/drawing/2010/main" xmlns="" w="9525">
                   <a:solidFill>
                     <a:srgbClr val="000000"/>
                   </a:solidFill>
@@ -1616,7 +1616,7 @@
             </a:ln>
             <a:extLst>
               <a:ext uri="{91240B29-F687-4f45-9708-019B960494DF}">
-                <a14:hiddenLine xmlns="" xmlns:a14="http://schemas.microsoft.com/office/drawing/2010/main" w="9525">
+                <a14:hiddenLine xmlns:a14="http://schemas.microsoft.com/office/drawing/2010/main" xmlns="" w="9525">
                   <a:solidFill>
                     <a:srgbClr val="000000"/>
                   </a:solidFill>
@@ -1706,7 +1706,7 @@
             </a:ln>
             <a:extLst>
               <a:ext uri="{91240B29-F687-4f45-9708-019B960494DF}">
-                <a14:hiddenLine xmlns="" xmlns:a14="http://schemas.microsoft.com/office/drawing/2010/main" w="9525">
+                <a14:hiddenLine xmlns:a14="http://schemas.microsoft.com/office/drawing/2010/main" xmlns="" w="9525">
                   <a:solidFill>
                     <a:srgbClr val="000000"/>
                   </a:solidFill>
@@ -1762,7 +1762,7 @@
             </a:ln>
             <a:extLst>
               <a:ext uri="{91240B29-F687-4f45-9708-019B960494DF}">
-                <a14:hiddenLine xmlns="" xmlns:a14="http://schemas.microsoft.com/office/drawing/2010/main" w="9525">
+                <a14:hiddenLine xmlns:a14="http://schemas.microsoft.com/office/drawing/2010/main" xmlns="" w="9525">
                   <a:solidFill>
                     <a:srgbClr val="000000"/>
                   </a:solidFill>
@@ -1852,7 +1852,7 @@
             </a:ln>
             <a:extLst>
               <a:ext uri="{91240B29-F687-4f45-9708-019B960494DF}">
-                <a14:hiddenLine xmlns="" xmlns:a14="http://schemas.microsoft.com/office/drawing/2010/main" w="9525">
+                <a14:hiddenLine xmlns:a14="http://schemas.microsoft.com/office/drawing/2010/main" xmlns="" w="9525">
                   <a:solidFill>
                     <a:srgbClr val="000000"/>
                   </a:solidFill>
@@ -1908,7 +1908,7 @@
             </a:ln>
             <a:extLst>
               <a:ext uri="{91240B29-F687-4f45-9708-019B960494DF}">
-                <a14:hiddenLine xmlns="" xmlns:a14="http://schemas.microsoft.com/office/drawing/2010/main" w="9525">
+                <a14:hiddenLine xmlns:a14="http://schemas.microsoft.com/office/drawing/2010/main" xmlns="" w="9525">
                   <a:solidFill>
                     <a:srgbClr val="000000"/>
                   </a:solidFill>
@@ -1998,7 +1998,7 @@
             </a:ln>
             <a:extLst>
               <a:ext uri="{91240B29-F687-4f45-9708-019B960494DF}">
-                <a14:hiddenLine xmlns="" xmlns:a14="http://schemas.microsoft.com/office/drawing/2010/main" w="9525">
+                <a14:hiddenLine xmlns:a14="http://schemas.microsoft.com/office/drawing/2010/main" xmlns="" w="9525">
                   <a:solidFill>
                     <a:srgbClr val="000000"/>
                   </a:solidFill>
@@ -2066,7 +2066,7 @@
             </a:ln>
             <a:extLst>
               <a:ext uri="{91240B29-F687-4f45-9708-019B960494DF}">
-                <a14:hiddenLine xmlns="" xmlns:a14="http://schemas.microsoft.com/office/drawing/2010/main" w="9525">
+                <a14:hiddenLine xmlns:a14="http://schemas.microsoft.com/office/drawing/2010/main" xmlns="" w="9525">
                   <a:solidFill>
                     <a:srgbClr val="000000"/>
                   </a:solidFill>
@@ -2156,7 +2156,7 @@
             </a:ln>
             <a:extLst>
               <a:ext uri="{91240B29-F687-4f45-9708-019B960494DF}">
-                <a14:hiddenLine xmlns="" xmlns:a14="http://schemas.microsoft.com/office/drawing/2010/main" w="9525">
+                <a14:hiddenLine xmlns:a14="http://schemas.microsoft.com/office/drawing/2010/main" xmlns="" w="9525">
                   <a:solidFill>
                     <a:srgbClr val="000000"/>
                   </a:solidFill>
@@ -2224,7 +2224,7 @@
             </a:ln>
             <a:extLst>
               <a:ext uri="{91240B29-F687-4f45-9708-019B960494DF}">
-                <a14:hiddenLine xmlns="" xmlns:a14="http://schemas.microsoft.com/office/drawing/2010/main" w="9525">
+                <a14:hiddenLine xmlns:a14="http://schemas.microsoft.com/office/drawing/2010/main" xmlns="" w="9525">
                   <a:solidFill>
                     <a:srgbClr val="000000"/>
                   </a:solidFill>
@@ -2314,7 +2314,7 @@
             </a:ln>
             <a:extLst>
               <a:ext uri="{91240B29-F687-4f45-9708-019B960494DF}">
-                <a14:hiddenLine xmlns="" xmlns:a14="http://schemas.microsoft.com/office/drawing/2010/main" w="9525">
+                <a14:hiddenLine xmlns:a14="http://schemas.microsoft.com/office/drawing/2010/main" xmlns="" w="9525">
                   <a:solidFill>
                     <a:srgbClr val="000000"/>
                   </a:solidFill>
@@ -2348,7 +2348,7 @@
             </a:ln>
             <a:extLst>
               <a:ext uri="{91240B29-F687-4f45-9708-019B960494DF}">
-                <a14:hiddenLine xmlns="" xmlns:a14="http://schemas.microsoft.com/office/drawing/2010/main" w="9525">
+                <a14:hiddenLine xmlns:a14="http://schemas.microsoft.com/office/drawing/2010/main" xmlns="" w="9525">
                   <a:solidFill>
                     <a:srgbClr val="000000"/>
                   </a:solidFill>
@@ -2438,7 +2438,7 @@
             </a:ln>
             <a:extLst>
               <a:ext uri="{91240B29-F687-4f45-9708-019B960494DF}">
-                <a14:hiddenLine xmlns="" xmlns:a14="http://schemas.microsoft.com/office/drawing/2010/main" w="9525">
+                <a14:hiddenLine xmlns:a14="http://schemas.microsoft.com/office/drawing/2010/main" xmlns="" w="9525">
                   <a:solidFill>
                     <a:srgbClr val="000000"/>
                   </a:solidFill>
@@ -2500,7 +2500,7 @@
             </a:ln>
             <a:extLst>
               <a:ext uri="{91240B29-F687-4f45-9708-019B960494DF}">
-                <a14:hiddenLine xmlns="" xmlns:a14="http://schemas.microsoft.com/office/drawing/2010/main" w="9525">
+                <a14:hiddenLine xmlns:a14="http://schemas.microsoft.com/office/drawing/2010/main" xmlns="" w="9525">
                   <a:solidFill>
                     <a:srgbClr val="000000"/>
                   </a:solidFill>
@@ -2562,7 +2562,7 @@
             </a:ln>
             <a:extLst>
               <a:ext uri="{91240B29-F687-4f45-9708-019B960494DF}">
-                <a14:hiddenLine xmlns="" xmlns:a14="http://schemas.microsoft.com/office/drawing/2010/main" w="9525">
+                <a14:hiddenLine xmlns:a14="http://schemas.microsoft.com/office/drawing/2010/main" xmlns="" w="9525">
                   <a:solidFill>
                     <a:srgbClr val="000000"/>
                   </a:solidFill>
@@ -2652,7 +2652,7 @@
             </a:ln>
             <a:extLst>
               <a:ext uri="{91240B29-F687-4f45-9708-019B960494DF}">
-                <a14:hiddenLine xmlns="" xmlns:a14="http://schemas.microsoft.com/office/drawing/2010/main" w="9525">
+                <a14:hiddenLine xmlns:a14="http://schemas.microsoft.com/office/drawing/2010/main" xmlns="" w="9525">
                   <a:solidFill>
                     <a:srgbClr val="000000"/>
                   </a:solidFill>
@@ -2720,7 +2720,7 @@
             </a:ln>
             <a:extLst>
               <a:ext uri="{91240B29-F687-4f45-9708-019B960494DF}">
-                <a14:hiddenLine xmlns="" xmlns:a14="http://schemas.microsoft.com/office/drawing/2010/main" w="9525">
+                <a14:hiddenLine xmlns:a14="http://schemas.microsoft.com/office/drawing/2010/main" xmlns="" w="9525">
                   <a:solidFill>
                     <a:srgbClr val="000000"/>
                   </a:solidFill>
@@ -2782,7 +2782,7 @@
             </a:ln>
             <a:extLst>
               <a:ext uri="{91240B29-F687-4f45-9708-019B960494DF}">
-                <a14:hiddenLine xmlns="" xmlns:a14="http://schemas.microsoft.com/office/drawing/2010/main" w="9525">
+                <a14:hiddenLine xmlns:a14="http://schemas.microsoft.com/office/drawing/2010/main" xmlns="" w="9525">
                   <a:solidFill>
                     <a:srgbClr val="000000"/>
                   </a:solidFill>
@@ -2872,7 +2872,7 @@
             </a:ln>
             <a:extLst>
               <a:ext uri="{91240B29-F687-4f45-9708-019B960494DF}">
-                <a14:hiddenLine xmlns="" xmlns:a14="http://schemas.microsoft.com/office/drawing/2010/main" w="9525">
+                <a14:hiddenLine xmlns:a14="http://schemas.microsoft.com/office/drawing/2010/main" xmlns="" w="9525">
                   <a:solidFill>
                     <a:srgbClr val="000000"/>
                   </a:solidFill>
@@ -2934,7 +2934,7 @@
             </a:ln>
             <a:extLst>
               <a:ext uri="{91240B29-F687-4f45-9708-019B960494DF}">
-                <a14:hiddenLine xmlns="" xmlns:a14="http://schemas.microsoft.com/office/drawing/2010/main" w="9525">
+                <a14:hiddenLine xmlns:a14="http://schemas.microsoft.com/office/drawing/2010/main" xmlns="" w="9525">
                   <a:solidFill>
                     <a:srgbClr val="000000"/>
                   </a:solidFill>
@@ -3024,7 +3024,7 @@
             </a:ln>
             <a:extLst>
               <a:ext uri="{91240B29-F687-4f45-9708-019B960494DF}">
-                <a14:hiddenLine xmlns="" xmlns:a14="http://schemas.microsoft.com/office/drawing/2010/main" w="9525">
+                <a14:hiddenLine xmlns:a14="http://schemas.microsoft.com/office/drawing/2010/main" xmlns="" w="9525">
                   <a:solidFill>
                     <a:srgbClr val="000000"/>
                   </a:solidFill>
@@ -3086,7 +3086,7 @@
             </a:ln>
             <a:extLst>
               <a:ext uri="{91240B29-F687-4f45-9708-019B960494DF}">
-                <a14:hiddenLine xmlns="" xmlns:a14="http://schemas.microsoft.com/office/drawing/2010/main" w="9525">
+                <a14:hiddenLine xmlns:a14="http://schemas.microsoft.com/office/drawing/2010/main" xmlns="" w="9525">
                   <a:solidFill>
                     <a:srgbClr val="000000"/>
                   </a:solidFill>
@@ -3176,7 +3176,7 @@
             </a:ln>
             <a:extLst>
               <a:ext uri="{91240B29-F687-4f45-9708-019B960494DF}">
-                <a14:hiddenLine xmlns="" xmlns:a14="http://schemas.microsoft.com/office/drawing/2010/main" w="9525">
+                <a14:hiddenLine xmlns:a14="http://schemas.microsoft.com/office/drawing/2010/main" xmlns="" w="9525">
                   <a:solidFill>
                     <a:srgbClr val="000000"/>
                   </a:solidFill>
@@ -3210,7 +3210,7 @@
             </a:ln>
             <a:extLst>
               <a:ext uri="{91240B29-F687-4f45-9708-019B960494DF}">
-                <a14:hiddenLine xmlns="" xmlns:a14="http://schemas.microsoft.com/office/drawing/2010/main" w="9525">
+                <a14:hiddenLine xmlns:a14="http://schemas.microsoft.com/office/drawing/2010/main" xmlns="" w="9525">
                   <a:solidFill>
                     <a:srgbClr val="000000"/>
                   </a:solidFill>
@@ -3275,7 +3275,7 @@
             </a:ln>
             <a:extLst>
               <a:ext uri="{91240B29-F687-4f45-9708-019B960494DF}">
-                <a14:hiddenLine xmlns="" xmlns:a14="http://schemas.microsoft.com/office/drawing/2010/main" w="9525">
+                <a14:hiddenLine xmlns:a14="http://schemas.microsoft.com/office/drawing/2010/main" xmlns="" w="9525">
                   <a:solidFill>
                     <a:srgbClr val="000000"/>
                   </a:solidFill>
@@ -3365,7 +3365,7 @@
             </a:ln>
             <a:extLst>
               <a:ext uri="{91240B29-F687-4f45-9708-019B960494DF}">
-                <a14:hiddenLine xmlns="" xmlns:a14="http://schemas.microsoft.com/office/drawing/2010/main" w="9525">
+                <a14:hiddenLine xmlns:a14="http://schemas.microsoft.com/office/drawing/2010/main" xmlns="" w="9525">
                   <a:solidFill>
                     <a:srgbClr val="000000"/>
                   </a:solidFill>
@@ -3427,7 +3427,7 @@
             </a:ln>
             <a:extLst>
               <a:ext uri="{91240B29-F687-4f45-9708-019B960494DF}">
-                <a14:hiddenLine xmlns="" xmlns:a14="http://schemas.microsoft.com/office/drawing/2010/main" w="9525">
+                <a14:hiddenLine xmlns:a14="http://schemas.microsoft.com/office/drawing/2010/main" xmlns="" w="9525">
                   <a:solidFill>
                     <a:srgbClr val="000000"/>
                   </a:solidFill>
@@ -3517,7 +3517,7 @@
             </a:ln>
             <a:extLst>
               <a:ext uri="{91240B29-F687-4f45-9708-019B960494DF}">
-                <a14:hiddenLine xmlns="" xmlns:a14="http://schemas.microsoft.com/office/drawing/2010/main" w="9525">
+                <a14:hiddenLine xmlns:a14="http://schemas.microsoft.com/office/drawing/2010/main" xmlns="" w="9525">
                   <a:solidFill>
                     <a:srgbClr val="000000"/>
                   </a:solidFill>
@@ -3607,7 +3607,7 @@
             </a:ln>
             <a:extLst>
               <a:ext uri="{91240B29-F687-4f45-9708-019B960494DF}">
-                <a14:hiddenLine xmlns="" xmlns:a14="http://schemas.microsoft.com/office/drawing/2010/main" w="9525">
+                <a14:hiddenLine xmlns:a14="http://schemas.microsoft.com/office/drawing/2010/main" xmlns="" w="9525">
                   <a:solidFill>
                     <a:srgbClr val="000000"/>
                   </a:solidFill>
@@ -3672,7 +3672,7 @@
             </a:ln>
             <a:extLst>
               <a:ext uri="{91240B29-F687-4f45-9708-019B960494DF}">
-                <a14:hiddenLine xmlns="" xmlns:a14="http://schemas.microsoft.com/office/drawing/2010/main" w="9525">
+                <a14:hiddenLine xmlns:a14="http://schemas.microsoft.com/office/drawing/2010/main" xmlns="" w="9525">
                   <a:solidFill>
                     <a:srgbClr val="000000"/>
                   </a:solidFill>
@@ -3734,7 +3734,7 @@
             </a:ln>
             <a:extLst>
               <a:ext uri="{91240B29-F687-4f45-9708-019B960494DF}">
-                <a14:hiddenLine xmlns="" xmlns:a14="http://schemas.microsoft.com/office/drawing/2010/main" w="9525">
+                <a14:hiddenLine xmlns:a14="http://schemas.microsoft.com/office/drawing/2010/main" xmlns="" w="9525">
                   <a:solidFill>
                     <a:srgbClr val="000000"/>
                   </a:solidFill>
@@ -3824,7 +3824,7 @@
             </a:ln>
             <a:extLst>
               <a:ext uri="{91240B29-F687-4f45-9708-019B960494DF}">
-                <a14:hiddenLine xmlns="" xmlns:a14="http://schemas.microsoft.com/office/drawing/2010/main" w="9525">
+                <a14:hiddenLine xmlns:a14="http://schemas.microsoft.com/office/drawing/2010/main" xmlns="" w="9525">
                   <a:solidFill>
                     <a:srgbClr val="000000"/>
                   </a:solidFill>
@@ -3914,7 +3914,7 @@
             </a:ln>
             <a:extLst>
               <a:ext uri="{91240B29-F687-4f45-9708-019B960494DF}">
-                <a14:hiddenLine xmlns="" xmlns:a14="http://schemas.microsoft.com/office/drawing/2010/main" w="9525">
+                <a14:hiddenLine xmlns:a14="http://schemas.microsoft.com/office/drawing/2010/main" xmlns="" w="9525">
                   <a:solidFill>
                     <a:srgbClr val="000000"/>
                   </a:solidFill>
@@ -3976,7 +3976,7 @@
             </a:ln>
             <a:extLst>
               <a:ext uri="{91240B29-F687-4f45-9708-019B960494DF}">
-                <a14:hiddenLine xmlns="" xmlns:a14="http://schemas.microsoft.com/office/drawing/2010/main" w="9525">
+                <a14:hiddenLine xmlns:a14="http://schemas.microsoft.com/office/drawing/2010/main" xmlns="" w="9525">
                   <a:solidFill>
                     <a:srgbClr val="000000"/>
                   </a:solidFill>
@@ -4096,7 +4096,7 @@
             </a:ln>
             <a:extLst>
               <a:ext uri="{91240B29-F687-4f45-9708-019B960494DF}">
-                <a14:hiddenLine xmlns="" xmlns:a14="http://schemas.microsoft.com/office/drawing/2010/main" w="9525">
+                <a14:hiddenLine xmlns:a14="http://schemas.microsoft.com/office/drawing/2010/main" xmlns="" w="9525">
                   <a:solidFill>
                     <a:srgbClr val="000000"/>
                   </a:solidFill>
@@ -4164,7 +4164,7 @@
             </a:ln>
             <a:extLst>
               <a:ext uri="{91240B29-F687-4f45-9708-019B960494DF}">
-                <a14:hiddenLine xmlns="" xmlns:a14="http://schemas.microsoft.com/office/drawing/2010/main" w="9525">
+                <a14:hiddenLine xmlns:a14="http://schemas.microsoft.com/office/drawing/2010/main" xmlns="" w="9525">
                   <a:solidFill>
                     <a:srgbClr val="000000"/>
                   </a:solidFill>
@@ -4254,7 +4254,7 @@
             </a:ln>
             <a:extLst>
               <a:ext uri="{91240B29-F687-4f45-9708-019B960494DF}">
-                <a14:hiddenLine xmlns="" xmlns:a14="http://schemas.microsoft.com/office/drawing/2010/main" w="9525">
+                <a14:hiddenLine xmlns:a14="http://schemas.microsoft.com/office/drawing/2010/main" xmlns="" w="9525">
                   <a:solidFill>
                     <a:srgbClr val="000000"/>
                   </a:solidFill>
@@ -4394,7 +4394,7 @@
           <a:p>
             <a:fld id="{3B57195E-6F70-4CDB-8628-8204974371BE}" type="datetimeFigureOut">
               <a:rPr lang="fr-FR" smtClean="0"/>
-              <a:t>04/03/2019</a:t>
+              <a:t>07/03/2019</a:t>
             </a:fld>
             <a:endParaRPr lang="fr-FR"/>
           </a:p>
@@ -4661,7 +4661,7 @@
           <a:p>
             <a:fld id="{3B57195E-6F70-4CDB-8628-8204974371BE}" type="datetimeFigureOut">
               <a:rPr lang="fr-FR" smtClean="0"/>
-              <a:t>04/03/2019</a:t>
+              <a:t>07/03/2019</a:t>
             </a:fld>
             <a:endParaRPr lang="fr-FR"/>
           </a:p>
@@ -4857,7 +4857,7 @@
           <a:p>
             <a:fld id="{3B57195E-6F70-4CDB-8628-8204974371BE}" type="datetimeFigureOut">
               <a:rPr lang="fr-FR" smtClean="0"/>
-              <a:t>04/03/2019</a:t>
+              <a:t>07/03/2019</a:t>
             </a:fld>
             <a:endParaRPr lang="fr-FR"/>
           </a:p>
@@ -5120,7 +5120,7 @@
           <a:p>
             <a:fld id="{3B57195E-6F70-4CDB-8628-8204974371BE}" type="datetimeFigureOut">
               <a:rPr lang="fr-FR" smtClean="0"/>
-              <a:t>04/03/2019</a:t>
+              <a:t>07/03/2019</a:t>
             </a:fld>
             <a:endParaRPr lang="fr-FR"/>
           </a:p>
@@ -5554,7 +5554,7 @@
           <a:p>
             <a:fld id="{3B57195E-6F70-4CDB-8628-8204974371BE}" type="datetimeFigureOut">
               <a:rPr lang="fr-FR" smtClean="0"/>
-              <a:t>04/03/2019</a:t>
+              <a:t>07/03/2019</a:t>
             </a:fld>
             <a:endParaRPr lang="fr-FR"/>
           </a:p>
@@ -6100,7 +6100,7 @@
           <a:p>
             <a:fld id="{3B57195E-6F70-4CDB-8628-8204974371BE}" type="datetimeFigureOut">
               <a:rPr lang="fr-FR" smtClean="0"/>
-              <a:t>04/03/2019</a:t>
+              <a:t>07/03/2019</a:t>
             </a:fld>
             <a:endParaRPr lang="fr-FR"/>
           </a:p>
@@ -6820,7 +6820,7 @@
           <a:p>
             <a:fld id="{3B57195E-6F70-4CDB-8628-8204974371BE}" type="datetimeFigureOut">
               <a:rPr lang="fr-FR" smtClean="0"/>
-              <a:t>04/03/2019</a:t>
+              <a:t>07/03/2019</a:t>
             </a:fld>
             <a:endParaRPr lang="fr-FR"/>
           </a:p>
@@ -6990,7 +6990,7 @@
           <a:p>
             <a:fld id="{3B57195E-6F70-4CDB-8628-8204974371BE}" type="datetimeFigureOut">
               <a:rPr lang="fr-FR" smtClean="0"/>
-              <a:t>04/03/2019</a:t>
+              <a:t>07/03/2019</a:t>
             </a:fld>
             <a:endParaRPr lang="fr-FR"/>
           </a:p>
@@ -7170,7 +7170,7 @@
           <a:p>
             <a:fld id="{3B57195E-6F70-4CDB-8628-8204974371BE}" type="datetimeFigureOut">
               <a:rPr lang="fr-FR" smtClean="0"/>
-              <a:t>04/03/2019</a:t>
+              <a:t>07/03/2019</a:t>
             </a:fld>
             <a:endParaRPr lang="fr-FR"/>
           </a:p>
@@ -7340,7 +7340,7 @@
           <a:p>
             <a:fld id="{3B57195E-6F70-4CDB-8628-8204974371BE}" type="datetimeFigureOut">
               <a:rPr lang="fr-FR" smtClean="0"/>
-              <a:t>04/03/2019</a:t>
+              <a:t>07/03/2019</a:t>
             </a:fld>
             <a:endParaRPr lang="fr-FR"/>
           </a:p>
@@ -7590,7 +7590,7 @@
           <a:p>
             <a:fld id="{3B57195E-6F70-4CDB-8628-8204974371BE}" type="datetimeFigureOut">
               <a:rPr lang="fr-FR" smtClean="0"/>
-              <a:t>04/03/2019</a:t>
+              <a:t>07/03/2019</a:t>
             </a:fld>
             <a:endParaRPr lang="fr-FR"/>
           </a:p>
@@ -7822,7 +7822,7 @@
           <a:p>
             <a:fld id="{3B57195E-6F70-4CDB-8628-8204974371BE}" type="datetimeFigureOut">
               <a:rPr lang="fr-FR" smtClean="0"/>
-              <a:t>04/03/2019</a:t>
+              <a:t>07/03/2019</a:t>
             </a:fld>
             <a:endParaRPr lang="fr-FR"/>
           </a:p>
@@ -8203,7 +8203,7 @@
           <a:p>
             <a:fld id="{3B57195E-6F70-4CDB-8628-8204974371BE}" type="datetimeFigureOut">
               <a:rPr lang="fr-FR" smtClean="0"/>
-              <a:t>04/03/2019</a:t>
+              <a:t>07/03/2019</a:t>
             </a:fld>
             <a:endParaRPr lang="fr-FR"/>
           </a:p>
@@ -8321,7 +8321,7 @@
           <a:p>
             <a:fld id="{3B57195E-6F70-4CDB-8628-8204974371BE}" type="datetimeFigureOut">
               <a:rPr lang="fr-FR" smtClean="0"/>
-              <a:t>04/03/2019</a:t>
+              <a:t>07/03/2019</a:t>
             </a:fld>
             <a:endParaRPr lang="fr-FR"/>
           </a:p>
@@ -8416,7 +8416,7 @@
           <a:p>
             <a:fld id="{3B57195E-6F70-4CDB-8628-8204974371BE}" type="datetimeFigureOut">
               <a:rPr lang="fr-FR" smtClean="0"/>
-              <a:t>04/03/2019</a:t>
+              <a:t>07/03/2019</a:t>
             </a:fld>
             <a:endParaRPr lang="fr-FR"/>
           </a:p>
@@ -8665,7 +8665,7 @@
           <a:p>
             <a:fld id="{3B57195E-6F70-4CDB-8628-8204974371BE}" type="datetimeFigureOut">
               <a:rPr lang="fr-FR" smtClean="0"/>
-              <a:t>04/03/2019</a:t>
+              <a:t>07/03/2019</a:t>
             </a:fld>
             <a:endParaRPr lang="fr-FR"/>
           </a:p>
@@ -8945,7 +8945,7 @@
           <a:p>
             <a:fld id="{3B57195E-6F70-4CDB-8628-8204974371BE}" type="datetimeFigureOut">
               <a:rPr lang="fr-FR" smtClean="0"/>
-              <a:t>04/03/2019</a:t>
+              <a:t>07/03/2019</a:t>
             </a:fld>
             <a:endParaRPr lang="fr-FR"/>
           </a:p>
@@ -9061,7 +9061,7 @@
           <a:noFill/>
           <a:extLst>
             <a:ext uri="{909E8E84-426E-40dd-AFC4-6F175D3DCCD1}">
-              <a14:hiddenFill xmlns="" xmlns:a14="http://schemas.microsoft.com/office/drawing/2010/main">
+              <a14:hiddenFill xmlns:a14="http://schemas.microsoft.com/office/drawing/2010/main" xmlns="">
                 <a:solidFill>
                   <a:srgbClr val="FFFFFF"/>
                 </a:solidFill>
@@ -9135,7 +9135,7 @@
               </a:ln>
               <a:extLst>
                 <a:ext uri="{91240B29-F687-4f45-9708-019B960494DF}">
-                  <a14:hiddenLine xmlns="" xmlns:a14="http://schemas.microsoft.com/office/drawing/2010/main" w="9525">
+                  <a14:hiddenLine xmlns:a14="http://schemas.microsoft.com/office/drawing/2010/main" xmlns="" w="9525">
                     <a:solidFill>
                       <a:srgbClr val="000000"/>
                     </a:solidFill>
@@ -9225,7 +9225,7 @@
               </a:ln>
               <a:extLst>
                 <a:ext uri="{91240B29-F687-4f45-9708-019B960494DF}">
-                  <a14:hiddenLine xmlns="" xmlns:a14="http://schemas.microsoft.com/office/drawing/2010/main" w="9525">
+                  <a14:hiddenLine xmlns:a14="http://schemas.microsoft.com/office/drawing/2010/main" xmlns="" w="9525">
                     <a:solidFill>
                       <a:srgbClr val="000000"/>
                     </a:solidFill>
@@ -9315,7 +9315,7 @@
               </a:ln>
               <a:extLst>
                 <a:ext uri="{91240B29-F687-4f45-9708-019B960494DF}">
-                  <a14:hiddenLine xmlns="" xmlns:a14="http://schemas.microsoft.com/office/drawing/2010/main" w="9525">
+                  <a14:hiddenLine xmlns:a14="http://schemas.microsoft.com/office/drawing/2010/main" xmlns="" w="9525">
                     <a:solidFill>
                       <a:srgbClr val="000000"/>
                     </a:solidFill>
@@ -9377,7 +9377,7 @@
               </a:ln>
               <a:extLst>
                 <a:ext uri="{91240B29-F687-4f45-9708-019B960494DF}">
-                  <a14:hiddenLine xmlns="" xmlns:a14="http://schemas.microsoft.com/office/drawing/2010/main" w="9525">
+                  <a14:hiddenLine xmlns:a14="http://schemas.microsoft.com/office/drawing/2010/main" xmlns="" w="9525">
                     <a:solidFill>
                       <a:srgbClr val="000000"/>
                     </a:solidFill>
@@ -9467,7 +9467,7 @@
               </a:ln>
               <a:extLst>
                 <a:ext uri="{91240B29-F687-4f45-9708-019B960494DF}">
-                  <a14:hiddenLine xmlns="" xmlns:a14="http://schemas.microsoft.com/office/drawing/2010/main" w="9525">
+                  <a14:hiddenLine xmlns:a14="http://schemas.microsoft.com/office/drawing/2010/main" xmlns="" w="9525">
                     <a:solidFill>
                       <a:srgbClr val="000000"/>
                     </a:solidFill>
@@ -9529,7 +9529,7 @@
               </a:ln>
               <a:extLst>
                 <a:ext uri="{91240B29-F687-4f45-9708-019B960494DF}">
-                  <a14:hiddenLine xmlns="" xmlns:a14="http://schemas.microsoft.com/office/drawing/2010/main" w="9525">
+                  <a14:hiddenLine xmlns:a14="http://schemas.microsoft.com/office/drawing/2010/main" xmlns="" w="9525">
                     <a:solidFill>
                       <a:srgbClr val="000000"/>
                     </a:solidFill>
@@ -9591,7 +9591,7 @@
               </a:ln>
               <a:extLst>
                 <a:ext uri="{91240B29-F687-4f45-9708-019B960494DF}">
-                  <a14:hiddenLine xmlns="" xmlns:a14="http://schemas.microsoft.com/office/drawing/2010/main" w="9525">
+                  <a14:hiddenLine xmlns:a14="http://schemas.microsoft.com/office/drawing/2010/main" xmlns="" w="9525">
                     <a:solidFill>
                       <a:srgbClr val="000000"/>
                     </a:solidFill>
@@ -9681,7 +9681,7 @@
               </a:ln>
               <a:extLst>
                 <a:ext uri="{91240B29-F687-4f45-9708-019B960494DF}">
-                  <a14:hiddenLine xmlns="" xmlns:a14="http://schemas.microsoft.com/office/drawing/2010/main" w="9525">
+                  <a14:hiddenLine xmlns:a14="http://schemas.microsoft.com/office/drawing/2010/main" xmlns="" w="9525">
                     <a:solidFill>
                       <a:srgbClr val="000000"/>
                     </a:solidFill>
@@ -9771,7 +9771,7 @@
               </a:ln>
               <a:extLst>
                 <a:ext uri="{91240B29-F687-4f45-9708-019B960494DF}">
-                  <a14:hiddenLine xmlns="" xmlns:a14="http://schemas.microsoft.com/office/drawing/2010/main" w="9525">
+                  <a14:hiddenLine xmlns:a14="http://schemas.microsoft.com/office/drawing/2010/main" xmlns="" w="9525">
                     <a:solidFill>
                       <a:srgbClr val="000000"/>
                     </a:solidFill>
@@ -9833,7 +9833,7 @@
               </a:ln>
               <a:extLst>
                 <a:ext uri="{91240B29-F687-4f45-9708-019B960494DF}">
-                  <a14:hiddenLine xmlns="" xmlns:a14="http://schemas.microsoft.com/office/drawing/2010/main" w="9525">
+                  <a14:hiddenLine xmlns:a14="http://schemas.microsoft.com/office/drawing/2010/main" xmlns="" w="9525">
                     <a:solidFill>
                       <a:srgbClr val="000000"/>
                     </a:solidFill>
@@ -9943,7 +9943,7 @@
               </a:ln>
               <a:extLst>
                 <a:ext uri="{91240B29-F687-4f45-9708-019B960494DF}">
-                  <a14:hiddenLine xmlns="" xmlns:a14="http://schemas.microsoft.com/office/drawing/2010/main" w="9525">
+                  <a14:hiddenLine xmlns:a14="http://schemas.microsoft.com/office/drawing/2010/main" xmlns="" w="9525">
                     <a:solidFill>
                       <a:srgbClr val="000000"/>
                     </a:solidFill>
@@ -10027,7 +10027,7 @@
               </a:ln>
               <a:extLst>
                 <a:ext uri="{91240B29-F687-4f45-9708-019B960494DF}">
-                  <a14:hiddenLine xmlns="" xmlns:a14="http://schemas.microsoft.com/office/drawing/2010/main" w="9525">
+                  <a14:hiddenLine xmlns:a14="http://schemas.microsoft.com/office/drawing/2010/main" xmlns="" w="9525">
                     <a:solidFill>
                       <a:srgbClr val="000000"/>
                     </a:solidFill>
@@ -10089,7 +10089,7 @@
               </a:ln>
               <a:extLst>
                 <a:ext uri="{91240B29-F687-4f45-9708-019B960494DF}">
-                  <a14:hiddenLine xmlns="" xmlns:a14="http://schemas.microsoft.com/office/drawing/2010/main" w="9525">
+                  <a14:hiddenLine xmlns:a14="http://schemas.microsoft.com/office/drawing/2010/main" xmlns="" w="9525">
                     <a:solidFill>
                       <a:srgbClr val="000000"/>
                     </a:solidFill>
@@ -10151,7 +10151,7 @@
               </a:ln>
               <a:extLst>
                 <a:ext uri="{91240B29-F687-4f45-9708-019B960494DF}">
-                  <a14:hiddenLine xmlns="" xmlns:a14="http://schemas.microsoft.com/office/drawing/2010/main" w="9525">
+                  <a14:hiddenLine xmlns:a14="http://schemas.microsoft.com/office/drawing/2010/main" xmlns="" w="9525">
                     <a:solidFill>
                       <a:srgbClr val="000000"/>
                     </a:solidFill>
@@ -10241,7 +10241,7 @@
               </a:ln>
               <a:extLst>
                 <a:ext uri="{91240B29-F687-4f45-9708-019B960494DF}">
-                  <a14:hiddenLine xmlns="" xmlns:a14="http://schemas.microsoft.com/office/drawing/2010/main" w="9525">
+                  <a14:hiddenLine xmlns:a14="http://schemas.microsoft.com/office/drawing/2010/main" xmlns="" w="9525">
                     <a:solidFill>
                       <a:srgbClr val="000000"/>
                     </a:solidFill>
@@ -10275,7 +10275,7 @@
               </a:ln>
               <a:extLst>
                 <a:ext uri="{91240B29-F687-4f45-9708-019B960494DF}">
-                  <a14:hiddenLine xmlns="" xmlns:a14="http://schemas.microsoft.com/office/drawing/2010/main" w="9525">
+                  <a14:hiddenLine xmlns:a14="http://schemas.microsoft.com/office/drawing/2010/main" xmlns="" w="9525">
                     <a:solidFill>
                       <a:srgbClr val="000000"/>
                     </a:solidFill>
@@ -10340,7 +10340,7 @@
               </a:ln>
               <a:extLst>
                 <a:ext uri="{91240B29-F687-4f45-9708-019B960494DF}">
-                  <a14:hiddenLine xmlns="" xmlns:a14="http://schemas.microsoft.com/office/drawing/2010/main" w="9525">
+                  <a14:hiddenLine xmlns:a14="http://schemas.microsoft.com/office/drawing/2010/main" xmlns="" w="9525">
                     <a:solidFill>
                       <a:srgbClr val="000000"/>
                     </a:solidFill>
@@ -10430,7 +10430,7 @@
               </a:ln>
               <a:extLst>
                 <a:ext uri="{91240B29-F687-4f45-9708-019B960494DF}">
-                  <a14:hiddenLine xmlns="" xmlns:a14="http://schemas.microsoft.com/office/drawing/2010/main" w="9525">
+                  <a14:hiddenLine xmlns:a14="http://schemas.microsoft.com/office/drawing/2010/main" xmlns="" w="9525">
                     <a:solidFill>
                       <a:srgbClr val="000000"/>
                     </a:solidFill>
@@ -10492,7 +10492,7 @@
               </a:ln>
               <a:extLst>
                 <a:ext uri="{91240B29-F687-4f45-9708-019B960494DF}">
-                  <a14:hiddenLine xmlns="" xmlns:a14="http://schemas.microsoft.com/office/drawing/2010/main" w="9525">
+                  <a14:hiddenLine xmlns:a14="http://schemas.microsoft.com/office/drawing/2010/main" xmlns="" w="9525">
                     <a:solidFill>
                       <a:srgbClr val="000000"/>
                     </a:solidFill>
@@ -10582,7 +10582,7 @@
               </a:ln>
               <a:extLst>
                 <a:ext uri="{91240B29-F687-4f45-9708-019B960494DF}">
-                  <a14:hiddenLine xmlns="" xmlns:a14="http://schemas.microsoft.com/office/drawing/2010/main" w="9525">
+                  <a14:hiddenLine xmlns:a14="http://schemas.microsoft.com/office/drawing/2010/main" xmlns="" w="9525">
                     <a:solidFill>
                       <a:srgbClr val="000000"/>
                     </a:solidFill>
@@ -10647,7 +10647,7 @@
               </a:ln>
               <a:extLst>
                 <a:ext uri="{91240B29-F687-4f45-9708-019B960494DF}">
-                  <a14:hiddenLine xmlns="" xmlns:a14="http://schemas.microsoft.com/office/drawing/2010/main" w="9525">
+                  <a14:hiddenLine xmlns:a14="http://schemas.microsoft.com/office/drawing/2010/main" xmlns="" w="9525">
                     <a:solidFill>
                       <a:srgbClr val="000000"/>
                     </a:solidFill>
@@ -10709,7 +10709,7 @@
               </a:ln>
               <a:extLst>
                 <a:ext uri="{91240B29-F687-4f45-9708-019B960494DF}">
-                  <a14:hiddenLine xmlns="" xmlns:a14="http://schemas.microsoft.com/office/drawing/2010/main" w="9525">
+                  <a14:hiddenLine xmlns:a14="http://schemas.microsoft.com/office/drawing/2010/main" xmlns="" w="9525">
                     <a:solidFill>
                       <a:srgbClr val="000000"/>
                     </a:solidFill>
@@ -10799,7 +10799,7 @@
               </a:ln>
               <a:extLst>
                 <a:ext uri="{91240B29-F687-4f45-9708-019B960494DF}">
-                  <a14:hiddenLine xmlns="" xmlns:a14="http://schemas.microsoft.com/office/drawing/2010/main" w="9525">
+                  <a14:hiddenLine xmlns:a14="http://schemas.microsoft.com/office/drawing/2010/main" xmlns="" w="9525">
                     <a:solidFill>
                       <a:srgbClr val="000000"/>
                     </a:solidFill>
@@ -10889,7 +10889,7 @@
               </a:ln>
               <a:extLst>
                 <a:ext uri="{91240B29-F687-4f45-9708-019B960494DF}">
-                  <a14:hiddenLine xmlns="" xmlns:a14="http://schemas.microsoft.com/office/drawing/2010/main" w="9525">
+                  <a14:hiddenLine xmlns:a14="http://schemas.microsoft.com/office/drawing/2010/main" xmlns="" w="9525">
                     <a:solidFill>
                       <a:srgbClr val="000000"/>
                     </a:solidFill>
@@ -10954,7 +10954,7 @@
               </a:ln>
               <a:extLst>
                 <a:ext uri="{91240B29-F687-4f45-9708-019B960494DF}">
-                  <a14:hiddenLine xmlns="" xmlns:a14="http://schemas.microsoft.com/office/drawing/2010/main" w="9525">
+                  <a14:hiddenLine xmlns:a14="http://schemas.microsoft.com/office/drawing/2010/main" xmlns="" w="9525">
                     <a:solidFill>
                       <a:srgbClr val="000000"/>
                     </a:solidFill>
@@ -11074,7 +11074,7 @@
               </a:ln>
               <a:extLst>
                 <a:ext uri="{91240B29-F687-4f45-9708-019B960494DF}">
-                  <a14:hiddenLine xmlns="" xmlns:a14="http://schemas.microsoft.com/office/drawing/2010/main" w="9525">
+                  <a14:hiddenLine xmlns:a14="http://schemas.microsoft.com/office/drawing/2010/main" xmlns="" w="9525">
                     <a:solidFill>
                       <a:srgbClr val="000000"/>
                     </a:solidFill>
@@ -11172,7 +11172,7 @@
               </a:ln>
               <a:extLst>
                 <a:ext uri="{91240B29-F687-4f45-9708-019B960494DF}">
-                  <a14:hiddenLine xmlns="" xmlns:a14="http://schemas.microsoft.com/office/drawing/2010/main" w="9525">
+                  <a14:hiddenLine xmlns:a14="http://schemas.microsoft.com/office/drawing/2010/main" xmlns="" w="9525">
                     <a:solidFill>
                       <a:srgbClr val="000000"/>
                     </a:solidFill>
@@ -11287,7 +11287,7 @@
               </a:ln>
               <a:extLst>
                 <a:ext uri="{91240B29-F687-4f45-9708-019B960494DF}">
-                  <a14:hiddenLine xmlns="" xmlns:a14="http://schemas.microsoft.com/office/drawing/2010/main" w="9525">
+                  <a14:hiddenLine xmlns:a14="http://schemas.microsoft.com/office/drawing/2010/main" xmlns="" w="9525">
                     <a:solidFill>
                       <a:srgbClr val="000000"/>
                     </a:solidFill>
@@ -11377,7 +11377,7 @@
               </a:ln>
               <a:extLst>
                 <a:ext uri="{91240B29-F687-4f45-9708-019B960494DF}">
-                  <a14:hiddenLine xmlns="" xmlns:a14="http://schemas.microsoft.com/office/drawing/2010/main" w="9525">
+                  <a14:hiddenLine xmlns:a14="http://schemas.microsoft.com/office/drawing/2010/main" xmlns="" w="9525">
                     <a:solidFill>
                       <a:srgbClr val="000000"/>
                     </a:solidFill>
@@ -11442,7 +11442,7 @@
               </a:ln>
               <a:extLst>
                 <a:ext uri="{91240B29-F687-4f45-9708-019B960494DF}">
-                  <a14:hiddenLine xmlns="" xmlns:a14="http://schemas.microsoft.com/office/drawing/2010/main" w="9525">
+                  <a14:hiddenLine xmlns:a14="http://schemas.microsoft.com/office/drawing/2010/main" xmlns="" w="9525">
                     <a:solidFill>
                       <a:srgbClr val="000000"/>
                     </a:solidFill>
@@ -11532,7 +11532,7 @@
               </a:ln>
               <a:extLst>
                 <a:ext uri="{91240B29-F687-4f45-9708-019B960494DF}">
-                  <a14:hiddenLine xmlns="" xmlns:a14="http://schemas.microsoft.com/office/drawing/2010/main" w="9525">
+                  <a14:hiddenLine xmlns:a14="http://schemas.microsoft.com/office/drawing/2010/main" xmlns="" w="9525">
                     <a:solidFill>
                       <a:srgbClr val="000000"/>
                     </a:solidFill>
@@ -11600,7 +11600,7 @@
               </a:ln>
               <a:extLst>
                 <a:ext uri="{91240B29-F687-4f45-9708-019B960494DF}">
-                  <a14:hiddenLine xmlns="" xmlns:a14="http://schemas.microsoft.com/office/drawing/2010/main" w="9525">
+                  <a14:hiddenLine xmlns:a14="http://schemas.microsoft.com/office/drawing/2010/main" xmlns="" w="9525">
                     <a:solidFill>
                       <a:srgbClr val="000000"/>
                     </a:solidFill>
@@ -11690,7 +11690,7 @@
               </a:ln>
               <a:extLst>
                 <a:ext uri="{91240B29-F687-4f45-9708-019B960494DF}">
-                  <a14:hiddenLine xmlns="" xmlns:a14="http://schemas.microsoft.com/office/drawing/2010/main" w="9525">
+                  <a14:hiddenLine xmlns:a14="http://schemas.microsoft.com/office/drawing/2010/main" xmlns="" w="9525">
                     <a:solidFill>
                       <a:srgbClr val="000000"/>
                     </a:solidFill>
@@ -11758,7 +11758,7 @@
               </a:ln>
               <a:extLst>
                 <a:ext uri="{91240B29-F687-4f45-9708-019B960494DF}">
-                  <a14:hiddenLine xmlns="" xmlns:a14="http://schemas.microsoft.com/office/drawing/2010/main" w="9525">
+                  <a14:hiddenLine xmlns:a14="http://schemas.microsoft.com/office/drawing/2010/main" xmlns="" w="9525">
                     <a:solidFill>
                       <a:srgbClr val="000000"/>
                     </a:solidFill>
@@ -11848,7 +11848,7 @@
               </a:ln>
               <a:extLst>
                 <a:ext uri="{91240B29-F687-4f45-9708-019B960494DF}">
-                  <a14:hiddenLine xmlns="" xmlns:a14="http://schemas.microsoft.com/office/drawing/2010/main" w="9525">
+                  <a14:hiddenLine xmlns:a14="http://schemas.microsoft.com/office/drawing/2010/main" xmlns="" w="9525">
                     <a:solidFill>
                       <a:srgbClr val="000000"/>
                     </a:solidFill>
@@ -11882,7 +11882,7 @@
               </a:ln>
               <a:extLst>
                 <a:ext uri="{91240B29-F687-4f45-9708-019B960494DF}">
-                  <a14:hiddenLine xmlns="" xmlns:a14="http://schemas.microsoft.com/office/drawing/2010/main" w="9525">
+                  <a14:hiddenLine xmlns:a14="http://schemas.microsoft.com/office/drawing/2010/main" xmlns="" w="9525">
                     <a:solidFill>
                       <a:srgbClr val="000000"/>
                     </a:solidFill>
@@ -12022,7 +12022,7 @@
           <a:p>
             <a:fld id="{3B57195E-6F70-4CDB-8628-8204974371BE}" type="datetimeFigureOut">
               <a:rPr lang="fr-FR" smtClean="0"/>
-              <a:t>04/03/2019</a:t>
+              <a:t>07/03/2019</a:t>
             </a:fld>
             <a:endParaRPr lang="fr-FR"/>
           </a:p>
@@ -12612,7 +12612,7 @@
             <a:noFill/>
             <a:extLst>
               <a:ext uri="{909E8E84-426E-40dd-AFC4-6F175D3DCCD1}">
-                <a14:hiddenFill xmlns:a16="http://schemas.microsoft.com/office/drawing/2014/main" xmlns:p14="http://schemas.microsoft.com/office/powerpoint/2010/main" xmlns:a14="http://schemas.microsoft.com/office/drawing/2010/main" xmlns="">
+                <a14:hiddenFill xmlns="" xmlns:a14="http://schemas.microsoft.com/office/drawing/2010/main" xmlns:p14="http://schemas.microsoft.com/office/powerpoint/2010/main" xmlns:a16="http://schemas.microsoft.com/office/drawing/2014/main">
                   <a:solidFill>
                     <a:srgbClr val="FFFFFF"/>
                   </a:solidFill>
@@ -17760,6 +17760,14 @@
           <a:prstGeom prst="rightArrow">
             <a:avLst/>
           </a:prstGeom>
+          <a:solidFill>
+            <a:schemeClr val="tx2"/>
+          </a:solidFill>
+          <a:ln>
+            <a:solidFill>
+              <a:schemeClr val="bg2"/>
+            </a:solidFill>
+          </a:ln>
         </p:spPr>
         <p:style>
           <a:lnRef idx="2">
@@ -17782,7 +17790,14 @@
           <a:lstStyle/>
           <a:p>
             <a:pPr algn="ctr"/>
-            <a:endParaRPr lang="fr-FR"/>
+            <a:endParaRPr lang="fr-FR" dirty="0">
+              <a:solidFill>
+                <a:schemeClr val="bg2"/>
+              </a:solidFill>
+              <a:highlight>
+                <a:srgbClr val="0000FF"/>
+              </a:highlight>
+            </a:endParaRPr>
           </a:p>
         </p:txBody>
       </p:sp>
@@ -17836,7 +17851,7 @@
         <p:spPr>
           <a:xfrm>
             <a:off x="3476445" y="3063815"/>
-            <a:ext cx="8436634" cy="923330"/>
+            <a:ext cx="8436634" cy="646331"/>
           </a:xfrm>
           <a:prstGeom prst="rect">
             <a:avLst/>
@@ -17851,65 +17866,8 @@
           <a:p>
             <a:r>
               <a:rPr lang="fr-FR" dirty="0"/>
-              <a:t>Variables qui pointent vers des méthodes contenant la même signature.</a:t>
-            </a:r>
-          </a:p>
-          <a:p>
-            <a:r>
-              <a:rPr lang="fr-FR" dirty="0"/>
-              <a:t>Affichage Classique doit être une méthode qui prend en argument un String et renvoie également </a:t>
-            </a:r>
-            <a:r>
-              <a:rPr lang="fr-FR"/>
-              <a:t>un string.</a:t>
-            </a:r>
-            <a:endParaRPr lang="fr-FR" dirty="0"/>
-          </a:p>
-        </p:txBody>
-      </p:sp>
-      <p:sp>
-        <p:nvSpPr>
-          <p:cNvPr id="10" name="Flèche : droite 9">
-            <a:extLst>
-              <a:ext uri="{FF2B5EF4-FFF2-40B4-BE49-F238E27FC236}">
-                <a16:creationId xmlns:a16="http://schemas.microsoft.com/office/drawing/2014/main" id="{BA75ECE9-4607-49B0-B895-C4F5C116473F}"/>
-              </a:ext>
-            </a:extLst>
-          </p:cNvPr>
-          <p:cNvSpPr/>
-          <p:nvPr/>
-        </p:nvSpPr>
-        <p:spPr>
-          <a:xfrm>
-            <a:off x="3243532" y="3170843"/>
-            <a:ext cx="163902" cy="155275"/>
-          </a:xfrm>
-          <a:prstGeom prst="rightArrow">
-            <a:avLst/>
-          </a:prstGeom>
-        </p:spPr>
-        <p:style>
-          <a:lnRef idx="2">
-            <a:schemeClr val="accent1">
-              <a:shade val="50000"/>
-            </a:schemeClr>
-          </a:lnRef>
-          <a:fillRef idx="1">
-            <a:schemeClr val="accent1"/>
-          </a:fillRef>
-          <a:effectRef idx="0">
-            <a:schemeClr val="accent1"/>
-          </a:effectRef>
-          <a:fontRef idx="minor">
-            <a:schemeClr val="lt1"/>
-          </a:fontRef>
-        </p:style>
-        <p:txBody>
-          <a:bodyPr rtlCol="0" anchor="ctr"/>
-          <a:lstStyle/>
-          <a:p>
-            <a:pPr algn="ctr"/>
-            <a:endParaRPr lang="fr-FR"/>
+              <a:t>Affichage Classique doit être une méthode qui prend en argument un String et renvoie également un string.</a:t>
+            </a:r>
           </a:p>
         </p:txBody>
       </p:sp>
@@ -17963,6 +17921,425 @@
             <a:r>
               <a:rPr lang="fr-FR" dirty="0"/>
               <a:t>; </a:t>
+            </a:r>
+          </a:p>
+        </p:txBody>
+      </p:sp>
+      <p:sp>
+        <p:nvSpPr>
+          <p:cNvPr id="12" name="ZoneTexte 11">
+            <a:extLst>
+              <a:ext uri="{FF2B5EF4-FFF2-40B4-BE49-F238E27FC236}">
+                <a16:creationId xmlns:a16="http://schemas.microsoft.com/office/drawing/2014/main" id="{F73B59D2-C5C4-40E0-857F-5ADC6AAA882D}"/>
+              </a:ext>
+            </a:extLst>
+          </p:cNvPr>
+          <p:cNvSpPr txBox="1"/>
+          <p:nvPr/>
+        </p:nvSpPr>
+        <p:spPr>
+          <a:xfrm>
+            <a:off x="2424021" y="3855537"/>
+            <a:ext cx="8436634" cy="369332"/>
+          </a:xfrm>
+          <a:prstGeom prst="rect">
+            <a:avLst/>
+          </a:prstGeom>
+          <a:noFill/>
+        </p:spPr>
+        <p:txBody>
+          <a:bodyPr wrap="square" rtlCol="0">
+            <a:spAutoFit/>
+          </a:bodyPr>
+          <a:lstStyle/>
+          <a:p>
+            <a:r>
+              <a:rPr lang="fr-FR" dirty="0"/>
+              <a:t>Variables qui pointent vers des méthodes quelconques : mot-clé </a:t>
+            </a:r>
+            <a:r>
+              <a:rPr lang="fr-FR" i="1" dirty="0" err="1"/>
+              <a:t>delegate</a:t>
+            </a:r>
+            <a:endParaRPr lang="fr-FR" i="1" dirty="0"/>
+          </a:p>
+        </p:txBody>
+      </p:sp>
+      <p:sp>
+        <p:nvSpPr>
+          <p:cNvPr id="4" name="Rectangle 3">
+            <a:extLst>
+              <a:ext uri="{FF2B5EF4-FFF2-40B4-BE49-F238E27FC236}">
+                <a16:creationId xmlns:a16="http://schemas.microsoft.com/office/drawing/2014/main" id="{944B6706-0710-4093-9382-990A95693928}"/>
+              </a:ext>
+            </a:extLst>
+          </p:cNvPr>
+          <p:cNvSpPr/>
+          <p:nvPr/>
+        </p:nvSpPr>
+        <p:spPr>
+          <a:xfrm>
+            <a:off x="4520241" y="4400445"/>
+            <a:ext cx="4301819" cy="375552"/>
+          </a:xfrm>
+          <a:prstGeom prst="rect">
+            <a:avLst/>
+          </a:prstGeom>
+          <a:solidFill>
+            <a:schemeClr val="bg1"/>
+          </a:solidFill>
+          <a:ln>
+            <a:solidFill>
+              <a:schemeClr val="tx1"/>
+            </a:solidFill>
+          </a:ln>
+        </p:spPr>
+        <p:txBody>
+          <a:bodyPr wrap="none">
+            <a:spAutoFit/>
+          </a:bodyPr>
+          <a:lstStyle/>
+          <a:p>
+            <a:pPr>
+              <a:lnSpc>
+                <a:spcPct val="107000"/>
+              </a:lnSpc>
+              <a:spcAft>
+                <a:spcPts val="0"/>
+              </a:spcAft>
+            </a:pPr>
+            <a:r>
+              <a:rPr lang="en-US" dirty="0" err="1">
+                <a:solidFill>
+                  <a:srgbClr val="000000"/>
+                </a:solidFill>
+                <a:ea typeface="Calibri" panose="020F0502020204030204" pitchFamily="34" charset="0"/>
+                <a:cs typeface="Calibri" panose="020F0502020204030204" pitchFamily="34" charset="0"/>
+              </a:rPr>
+              <a:t>ActionOnString</a:t>
+            </a:r>
+            <a:r>
+              <a:rPr lang="en-US" dirty="0">
+                <a:solidFill>
+                  <a:srgbClr val="000000"/>
+                </a:solidFill>
+                <a:ea typeface="Calibri" panose="020F0502020204030204" pitchFamily="34" charset="0"/>
+                <a:cs typeface="Calibri" panose="020F0502020204030204" pitchFamily="34" charset="0"/>
+              </a:rPr>
+              <a:t> test2 = </a:t>
+            </a:r>
+            <a:r>
+              <a:rPr lang="en-US" dirty="0">
+                <a:solidFill>
+                  <a:srgbClr val="0000FF"/>
+                </a:solidFill>
+                <a:ea typeface="Calibri" panose="020F0502020204030204" pitchFamily="34" charset="0"/>
+                <a:cs typeface="Calibri" panose="020F0502020204030204" pitchFamily="34" charset="0"/>
+              </a:rPr>
+              <a:t>delegate</a:t>
+            </a:r>
+            <a:r>
+              <a:rPr lang="en-US" dirty="0">
+                <a:solidFill>
+                  <a:srgbClr val="000000"/>
+                </a:solidFill>
+                <a:ea typeface="Calibri" panose="020F0502020204030204" pitchFamily="34" charset="0"/>
+                <a:cs typeface="Calibri" panose="020F0502020204030204" pitchFamily="34" charset="0"/>
+              </a:rPr>
+              <a:t> (</a:t>
+            </a:r>
+            <a:r>
+              <a:rPr lang="en-US" dirty="0">
+                <a:solidFill>
+                  <a:srgbClr val="0000FF"/>
+                </a:solidFill>
+                <a:ea typeface="Calibri" panose="020F0502020204030204" pitchFamily="34" charset="0"/>
+                <a:cs typeface="Calibri" panose="020F0502020204030204" pitchFamily="34" charset="0"/>
+              </a:rPr>
+              <a:t>string</a:t>
+            </a:r>
+            <a:r>
+              <a:rPr lang="en-US" dirty="0">
+                <a:solidFill>
+                  <a:srgbClr val="000000"/>
+                </a:solidFill>
+                <a:ea typeface="Calibri" panose="020F0502020204030204" pitchFamily="34" charset="0"/>
+                <a:cs typeface="Calibri" panose="020F0502020204030204" pitchFamily="34" charset="0"/>
+              </a:rPr>
+              <a:t> text)</a:t>
+            </a:r>
+            <a:endParaRPr lang="fr-FR" sz="3200" dirty="0">
+              <a:effectLst/>
+              <a:ea typeface="Calibri" panose="020F0502020204030204" pitchFamily="34" charset="0"/>
+              <a:cs typeface="Times New Roman" panose="02020603050405020304" pitchFamily="18" charset="0"/>
+            </a:endParaRPr>
+          </a:p>
+        </p:txBody>
+      </p:sp>
+      <p:sp>
+        <p:nvSpPr>
+          <p:cNvPr id="13" name="ZoneTexte 12">
+            <a:extLst>
+              <a:ext uri="{FF2B5EF4-FFF2-40B4-BE49-F238E27FC236}">
+                <a16:creationId xmlns:a16="http://schemas.microsoft.com/office/drawing/2014/main" id="{718C9A75-3621-49FD-9020-43961C234FF4}"/>
+              </a:ext>
+            </a:extLst>
+          </p:cNvPr>
+          <p:cNvSpPr txBox="1"/>
+          <p:nvPr/>
+        </p:nvSpPr>
+        <p:spPr>
+          <a:xfrm>
+            <a:off x="2424021" y="4963713"/>
+            <a:ext cx="8436634" cy="369332"/>
+          </a:xfrm>
+          <a:prstGeom prst="rect">
+            <a:avLst/>
+          </a:prstGeom>
+          <a:noFill/>
+        </p:spPr>
+        <p:txBody>
+          <a:bodyPr wrap="square" rtlCol="0">
+            <a:spAutoFit/>
+          </a:bodyPr>
+          <a:lstStyle/>
+          <a:p>
+            <a:r>
+              <a:rPr lang="fr-FR" dirty="0"/>
+              <a:t>Utilisation des expressions lambda pour simplifier</a:t>
+            </a:r>
+            <a:endParaRPr lang="fr-FR" i="1" dirty="0"/>
+          </a:p>
+        </p:txBody>
+      </p:sp>
+      <p:sp>
+        <p:nvSpPr>
+          <p:cNvPr id="14" name="Rectangle 13">
+            <a:extLst>
+              <a:ext uri="{FF2B5EF4-FFF2-40B4-BE49-F238E27FC236}">
+                <a16:creationId xmlns:a16="http://schemas.microsoft.com/office/drawing/2014/main" id="{948672FE-F6B4-4981-8DBD-65B8D29BF503}"/>
+              </a:ext>
+            </a:extLst>
+          </p:cNvPr>
+          <p:cNvSpPr/>
+          <p:nvPr/>
+        </p:nvSpPr>
+        <p:spPr>
+          <a:xfrm>
+            <a:off x="4520241" y="5574130"/>
+            <a:ext cx="3244543" cy="375552"/>
+          </a:xfrm>
+          <a:prstGeom prst="rect">
+            <a:avLst/>
+          </a:prstGeom>
+          <a:solidFill>
+            <a:schemeClr val="bg1"/>
+          </a:solidFill>
+          <a:ln>
+            <a:solidFill>
+              <a:schemeClr val="tx1"/>
+            </a:solidFill>
+          </a:ln>
+        </p:spPr>
+        <p:txBody>
+          <a:bodyPr wrap="none">
+            <a:spAutoFit/>
+          </a:bodyPr>
+          <a:lstStyle/>
+          <a:p>
+            <a:pPr>
+              <a:lnSpc>
+                <a:spcPct val="107000"/>
+              </a:lnSpc>
+              <a:spcAft>
+                <a:spcPts val="0"/>
+              </a:spcAft>
+            </a:pPr>
+            <a:r>
+              <a:rPr lang="en-US" dirty="0" err="1">
+                <a:solidFill>
+                  <a:srgbClr val="000000"/>
+                </a:solidFill>
+                <a:latin typeface="+mj-lt"/>
+                <a:ea typeface="Calibri" panose="020F0502020204030204" pitchFamily="34" charset="0"/>
+                <a:cs typeface="Calibri" panose="020F0502020204030204" pitchFamily="34" charset="0"/>
+              </a:rPr>
+              <a:t>ActionOnString</a:t>
+            </a:r>
+            <a:r>
+              <a:rPr lang="en-US" dirty="0">
+                <a:solidFill>
+                  <a:srgbClr val="000000"/>
+                </a:solidFill>
+                <a:latin typeface="Calibri" panose="020F0502020204030204" pitchFamily="34" charset="0"/>
+                <a:ea typeface="Calibri" panose="020F0502020204030204" pitchFamily="34" charset="0"/>
+                <a:cs typeface="Calibri" panose="020F0502020204030204" pitchFamily="34" charset="0"/>
+              </a:rPr>
+              <a:t> test3 = s =&gt; s + s;</a:t>
+            </a:r>
+            <a:endParaRPr lang="fr-FR" sz="3200" dirty="0">
+              <a:effectLst/>
+              <a:latin typeface="Calibri" panose="020F0502020204030204" pitchFamily="34" charset="0"/>
+              <a:ea typeface="Calibri" panose="020F0502020204030204" pitchFamily="34" charset="0"/>
+              <a:cs typeface="Times New Roman" panose="02020603050405020304" pitchFamily="18" charset="0"/>
+            </a:endParaRPr>
+          </a:p>
+        </p:txBody>
+      </p:sp>
+      <p:sp>
+        <p:nvSpPr>
+          <p:cNvPr id="18" name="Accolade fermante 17">
+            <a:extLst>
+              <a:ext uri="{FF2B5EF4-FFF2-40B4-BE49-F238E27FC236}">
+                <a16:creationId xmlns:a16="http://schemas.microsoft.com/office/drawing/2014/main" id="{427B7CC8-0045-46D3-9B39-9687F45F2A5E}"/>
+              </a:ext>
+            </a:extLst>
+          </p:cNvPr>
+          <p:cNvSpPr/>
+          <p:nvPr/>
+        </p:nvSpPr>
+        <p:spPr>
+          <a:xfrm rot="5400000">
+            <a:off x="6685681" y="5748913"/>
+            <a:ext cx="134224" cy="260059"/>
+          </a:xfrm>
+          <a:prstGeom prst="rightBrace">
+            <a:avLst/>
+          </a:prstGeom>
+        </p:spPr>
+        <p:style>
+          <a:lnRef idx="1">
+            <a:schemeClr val="accent5"/>
+          </a:lnRef>
+          <a:fillRef idx="0">
+            <a:schemeClr val="accent5"/>
+          </a:fillRef>
+          <a:effectRef idx="0">
+            <a:schemeClr val="accent5"/>
+          </a:effectRef>
+          <a:fontRef idx="minor">
+            <a:schemeClr val="tx1"/>
+          </a:fontRef>
+        </p:style>
+        <p:txBody>
+          <a:bodyPr rtlCol="0" anchor="ctr"/>
+          <a:lstStyle/>
+          <a:p>
+            <a:pPr algn="ctr"/>
+            <a:endParaRPr lang="fr-FR"/>
+          </a:p>
+        </p:txBody>
+      </p:sp>
+      <p:sp>
+        <p:nvSpPr>
+          <p:cNvPr id="19" name="Accolade fermante 18">
+            <a:extLst>
+              <a:ext uri="{FF2B5EF4-FFF2-40B4-BE49-F238E27FC236}">
+                <a16:creationId xmlns:a16="http://schemas.microsoft.com/office/drawing/2014/main" id="{45C22AB3-0AE1-4432-9142-09976AA9C416}"/>
+              </a:ext>
+            </a:extLst>
+          </p:cNvPr>
+          <p:cNvSpPr/>
+          <p:nvPr/>
+        </p:nvSpPr>
+        <p:spPr>
+          <a:xfrm rot="5400000">
+            <a:off x="7240824" y="5653568"/>
+            <a:ext cx="115408" cy="469570"/>
+          </a:xfrm>
+          <a:prstGeom prst="rightBrace">
+            <a:avLst/>
+          </a:prstGeom>
+        </p:spPr>
+        <p:style>
+          <a:lnRef idx="1">
+            <a:schemeClr val="accent5"/>
+          </a:lnRef>
+          <a:fillRef idx="0">
+            <a:schemeClr val="accent5"/>
+          </a:fillRef>
+          <a:effectRef idx="0">
+            <a:schemeClr val="accent5"/>
+          </a:effectRef>
+          <a:fontRef idx="minor">
+            <a:schemeClr val="tx1"/>
+          </a:fontRef>
+        </p:style>
+        <p:txBody>
+          <a:bodyPr rtlCol="0" anchor="ctr"/>
+          <a:lstStyle/>
+          <a:p>
+            <a:pPr algn="ctr"/>
+            <a:endParaRPr lang="fr-FR"/>
+          </a:p>
+        </p:txBody>
+      </p:sp>
+      <p:sp>
+        <p:nvSpPr>
+          <p:cNvPr id="20" name="ZoneTexte 19">
+            <a:extLst>
+              <a:ext uri="{FF2B5EF4-FFF2-40B4-BE49-F238E27FC236}">
+                <a16:creationId xmlns:a16="http://schemas.microsoft.com/office/drawing/2014/main" id="{1969535B-BF8D-4BE8-9A4D-6C013ACF1B9F}"/>
+              </a:ext>
+            </a:extLst>
+          </p:cNvPr>
+          <p:cNvSpPr txBox="1"/>
+          <p:nvPr/>
+        </p:nvSpPr>
+        <p:spPr>
+          <a:xfrm>
+            <a:off x="6006730" y="5878942"/>
+            <a:ext cx="1057013" cy="369332"/>
+          </a:xfrm>
+          <a:prstGeom prst="rect">
+            <a:avLst/>
+          </a:prstGeom>
+          <a:noFill/>
+        </p:spPr>
+        <p:txBody>
+          <a:bodyPr wrap="square" rtlCol="0">
+            <a:spAutoFit/>
+          </a:bodyPr>
+          <a:lstStyle/>
+          <a:p>
+            <a:r>
+              <a:rPr lang="fr-FR" dirty="0"/>
+              <a:t>Argument</a:t>
+            </a:r>
+          </a:p>
+        </p:txBody>
+      </p:sp>
+      <p:sp>
+        <p:nvSpPr>
+          <p:cNvPr id="21" name="ZoneTexte 20">
+            <a:extLst>
+              <a:ext uri="{FF2B5EF4-FFF2-40B4-BE49-F238E27FC236}">
+                <a16:creationId xmlns:a16="http://schemas.microsoft.com/office/drawing/2014/main" id="{1BDE1EE7-6937-4B3C-8AE7-050183F8CFF1}"/>
+              </a:ext>
+            </a:extLst>
+          </p:cNvPr>
+          <p:cNvSpPr txBox="1"/>
+          <p:nvPr/>
+        </p:nvSpPr>
+        <p:spPr>
+          <a:xfrm>
+            <a:off x="6942556" y="5878942"/>
+            <a:ext cx="1345767" cy="646331"/>
+          </a:xfrm>
+          <a:prstGeom prst="rect">
+            <a:avLst/>
+          </a:prstGeom>
+          <a:noFill/>
+        </p:spPr>
+        <p:txBody>
+          <a:bodyPr wrap="square" rtlCol="0">
+            <a:spAutoFit/>
+          </a:bodyPr>
+          <a:lstStyle/>
+          <a:p>
+            <a:r>
+              <a:rPr lang="fr-FR" dirty="0"/>
+              <a:t>Ce qui est retourné</a:t>
             </a:r>
           </a:p>
         </p:txBody>
@@ -18023,31 +18400,6 @@
           <a:chExt cx="0" cy="0"/>
         </a:xfrm>
       </p:grpSpPr>
-      <p:sp>
-        <p:nvSpPr>
-          <p:cNvPr id="4" name="Titre 3">
-            <a:extLst>
-              <a:ext uri="{FF2B5EF4-FFF2-40B4-BE49-F238E27FC236}">
-                <a16:creationId xmlns:a16="http://schemas.microsoft.com/office/drawing/2014/main" id="{3F814E00-E638-4290-A5C4-C890A899C9EC}"/>
-              </a:ext>
-            </a:extLst>
-          </p:cNvPr>
-          <p:cNvSpPr>
-            <a:spLocks noGrp="1"/>
-          </p:cNvSpPr>
-          <p:nvPr>
-            <p:ph type="ctrTitle"/>
-          </p:nvPr>
-        </p:nvSpPr>
-        <p:spPr/>
-        <p:txBody>
-          <a:bodyPr/>
-          <a:lstStyle/>
-          <a:p>
-            <a:endParaRPr lang="fr-FR"/>
-          </a:p>
-        </p:txBody>
-      </p:sp>
     </p:spTree>
     <p:extLst>
       <p:ext uri="{BB962C8B-B14F-4D97-AF65-F5344CB8AC3E}">

</xml_diff>